<commit_message>
final version of the DSM-TP presentation
</commit_message>
<xml_diff>
--- a/presentations/DSM-TP_2016.pptx
+++ b/presentations/DSM-TP_2016.pptx
@@ -5,38 +5,46 @@
     <p:sldMasterId id="2147484300" r:id="rId1"/>
   </p:sldMasterIdLst>
   <p:notesMasterIdLst>
-    <p:notesMasterId r:id="rId28"/>
+    <p:notesMasterId r:id="rId36"/>
   </p:notesMasterIdLst>
   <p:handoutMasterIdLst>
-    <p:handoutMasterId r:id="rId29"/>
+    <p:handoutMasterId r:id="rId37"/>
   </p:handoutMasterIdLst>
   <p:sldIdLst>
     <p:sldId id="312" r:id="rId2"/>
     <p:sldId id="415" r:id="rId3"/>
-    <p:sldId id="370" r:id="rId4"/>
-    <p:sldId id="395" r:id="rId5"/>
-    <p:sldId id="343" r:id="rId6"/>
-    <p:sldId id="344" r:id="rId7"/>
-    <p:sldId id="345" r:id="rId8"/>
-    <p:sldId id="394" r:id="rId9"/>
-    <p:sldId id="403" r:id="rId10"/>
-    <p:sldId id="404" r:id="rId11"/>
-    <p:sldId id="396" r:id="rId12"/>
-    <p:sldId id="397" r:id="rId13"/>
-    <p:sldId id="398" r:id="rId14"/>
-    <p:sldId id="399" r:id="rId15"/>
-    <p:sldId id="400" r:id="rId16"/>
-    <p:sldId id="406" r:id="rId17"/>
-    <p:sldId id="371" r:id="rId18"/>
-    <p:sldId id="401" r:id="rId19"/>
-    <p:sldId id="409" r:id="rId20"/>
-    <p:sldId id="407" r:id="rId21"/>
-    <p:sldId id="410" r:id="rId22"/>
-    <p:sldId id="411" r:id="rId23"/>
-    <p:sldId id="412" r:id="rId24"/>
-    <p:sldId id="408" r:id="rId25"/>
-    <p:sldId id="413" r:id="rId26"/>
-    <p:sldId id="414" r:id="rId27"/>
+    <p:sldId id="416" r:id="rId4"/>
+    <p:sldId id="370" r:id="rId5"/>
+    <p:sldId id="395" r:id="rId6"/>
+    <p:sldId id="343" r:id="rId7"/>
+    <p:sldId id="344" r:id="rId8"/>
+    <p:sldId id="345" r:id="rId9"/>
+    <p:sldId id="394" r:id="rId10"/>
+    <p:sldId id="423" r:id="rId11"/>
+    <p:sldId id="417" r:id="rId12"/>
+    <p:sldId id="418" r:id="rId13"/>
+    <p:sldId id="403" r:id="rId14"/>
+    <p:sldId id="404" r:id="rId15"/>
+    <p:sldId id="396" r:id="rId16"/>
+    <p:sldId id="397" r:id="rId17"/>
+    <p:sldId id="398" r:id="rId18"/>
+    <p:sldId id="399" r:id="rId19"/>
+    <p:sldId id="400" r:id="rId20"/>
+    <p:sldId id="406" r:id="rId21"/>
+    <p:sldId id="371" r:id="rId22"/>
+    <p:sldId id="401" r:id="rId23"/>
+    <p:sldId id="422" r:id="rId24"/>
+    <p:sldId id="409" r:id="rId25"/>
+    <p:sldId id="407" r:id="rId26"/>
+    <p:sldId id="410" r:id="rId27"/>
+    <p:sldId id="411" r:id="rId28"/>
+    <p:sldId id="412" r:id="rId29"/>
+    <p:sldId id="408" r:id="rId30"/>
+    <p:sldId id="413" r:id="rId31"/>
+    <p:sldId id="414" r:id="rId32"/>
+    <p:sldId id="419" r:id="rId33"/>
+    <p:sldId id="420" r:id="rId34"/>
+    <p:sldId id="421" r:id="rId35"/>
   </p:sldIdLst>
   <p:sldSz cx="9144000" cy="6858000" type="screen4x3"/>
   <p:notesSz cx="7010400" cy="9296400"/>
@@ -225,7 +233,7 @@
             <a:fld id="{7380A976-F269-1246-BE11-7D4BBA05CFBC}" type="datetime1">
               <a:rPr lang="en-CA" smtClean="0"/>
               <a:pPr/>
-              <a:t>8/22/16</a:t>
+              <a:t>8/23/16</a:t>
             </a:fld>
             <a:endParaRPr lang="en-US"/>
           </a:p>
@@ -397,7 +405,7 @@
             <a:fld id="{1EE27F80-5E74-DE49-919F-F9ED57292E0B}" type="datetime1">
               <a:rPr lang="en-CA" smtClean="0"/>
               <a:pPr/>
-              <a:t>8/22/16</a:t>
+              <a:t>8/23/16</a:t>
             </a:fld>
             <a:endParaRPr lang="en-US"/>
           </a:p>
@@ -775,6 +783,321 @@
 </p:notes>
 </file>
 
+<file path=ppt/notesSlides/notesSlide10.xml><?xml version="1.0" encoding="utf-8"?>
+<p:notes xmlns:a="http://schemas.openxmlformats.org/drawingml/2006/main" xmlns:r="http://schemas.openxmlformats.org/officeDocument/2006/relationships" xmlns:mc="http://schemas.openxmlformats.org/markup-compatibility/2006" xmlns:mv="urn:schemas-microsoft-com:mac:vml" xmlns:p="http://schemas.openxmlformats.org/presentationml/2006/main" mc:Ignorable="mv" mc:PreserveAttributes="mv:*">
+  <p:cSld>
+    <p:spTree>
+      <p:nvGrpSpPr>
+        <p:cNvPr id="1" name=""/>
+        <p:cNvGrpSpPr/>
+        <p:nvPr/>
+      </p:nvGrpSpPr>
+      <p:grpSpPr>
+        <a:xfrm>
+          <a:off x="0" y="0"/>
+          <a:ext cx="0" cy="0"/>
+          <a:chOff x="0" y="0"/>
+          <a:chExt cx="0" cy="0"/>
+        </a:xfrm>
+      </p:grpSpPr>
+      <p:sp>
+        <p:nvSpPr>
+          <p:cNvPr id="2" name="Slide Image Placeholder 1"/>
+          <p:cNvSpPr>
+            <a:spLocks noGrp="1" noRot="1" noChangeAspect="1"/>
+          </p:cNvSpPr>
+          <p:nvPr>
+            <p:ph type="sldImg"/>
+          </p:nvPr>
+        </p:nvSpPr>
+        <p:spPr/>
+      </p:sp>
+      <p:sp>
+        <p:nvSpPr>
+          <p:cNvPr id="3" name="Notes Placeholder 2"/>
+          <p:cNvSpPr>
+            <a:spLocks noGrp="1"/>
+          </p:cNvSpPr>
+          <p:nvPr>
+            <p:ph type="body" idx="1"/>
+          </p:nvPr>
+        </p:nvSpPr>
+        <p:spPr/>
+        <p:txBody>
+          <a:bodyPr>
+            <a:normAutofit/>
+          </a:bodyPr>
+          <a:lstStyle/>
+          <a:p>
+            <a:endParaRPr lang="en-US" dirty="0"/>
+          </a:p>
+        </p:txBody>
+      </p:sp>
+      <p:sp>
+        <p:nvSpPr>
+          <p:cNvPr id="4" name="Header Placeholder 3"/>
+          <p:cNvSpPr>
+            <a:spLocks noGrp="1"/>
+          </p:cNvSpPr>
+          <p:nvPr>
+            <p:ph type="hdr" sz="quarter" idx="10"/>
+          </p:nvPr>
+        </p:nvSpPr>
+        <p:spPr/>
+        <p:txBody>
+          <a:bodyPr/>
+          <a:lstStyle/>
+          <a:p>
+            <a:r>
+              <a:rPr lang="en-US" smtClean="0"/>
+              <a:t>The Power Window Case Study </a:t>
+            </a:r>
+            <a:endParaRPr lang="en-US"/>
+          </a:p>
+        </p:txBody>
+      </p:sp>
+      <p:sp>
+        <p:nvSpPr>
+          <p:cNvPr id="5" name="Slide Number Placeholder 4"/>
+          <p:cNvSpPr>
+            <a:spLocks noGrp="1"/>
+          </p:cNvSpPr>
+          <p:nvPr>
+            <p:ph type="sldNum" sz="quarter" idx="11"/>
+          </p:nvPr>
+        </p:nvSpPr>
+        <p:spPr/>
+        <p:txBody>
+          <a:bodyPr/>
+          <a:lstStyle/>
+          <a:p>
+            <a:fld id="{6A27271C-0365-E644-B832-D456B5387A92}" type="slidenum">
+              <a:rPr lang="en-US" smtClean="0"/>
+              <a:pPr/>
+              <a:t>32</a:t>
+            </a:fld>
+            <a:endParaRPr lang="en-US"/>
+          </a:p>
+        </p:txBody>
+      </p:sp>
+    </p:spTree>
+  </p:cSld>
+  <p:clrMapOvr>
+    <a:masterClrMapping/>
+  </p:clrMapOvr>
+</p:notes>
+</file>
+
+<file path=ppt/notesSlides/notesSlide11.xml><?xml version="1.0" encoding="utf-8"?>
+<p:notes xmlns:a="http://schemas.openxmlformats.org/drawingml/2006/main" xmlns:r="http://schemas.openxmlformats.org/officeDocument/2006/relationships" xmlns:mc="http://schemas.openxmlformats.org/markup-compatibility/2006" xmlns:mv="urn:schemas-microsoft-com:mac:vml" xmlns:p="http://schemas.openxmlformats.org/presentationml/2006/main" mc:Ignorable="mv" mc:PreserveAttributes="mv:*">
+  <p:cSld>
+    <p:spTree>
+      <p:nvGrpSpPr>
+        <p:cNvPr id="1" name=""/>
+        <p:cNvGrpSpPr/>
+        <p:nvPr/>
+      </p:nvGrpSpPr>
+      <p:grpSpPr>
+        <a:xfrm>
+          <a:off x="0" y="0"/>
+          <a:ext cx="0" cy="0"/>
+          <a:chOff x="0" y="0"/>
+          <a:chExt cx="0" cy="0"/>
+        </a:xfrm>
+      </p:grpSpPr>
+      <p:sp>
+        <p:nvSpPr>
+          <p:cNvPr id="2" name="Slide Image Placeholder 1"/>
+          <p:cNvSpPr>
+            <a:spLocks noGrp="1" noRot="1" noChangeAspect="1"/>
+          </p:cNvSpPr>
+          <p:nvPr>
+            <p:ph type="sldImg"/>
+          </p:nvPr>
+        </p:nvSpPr>
+        <p:spPr/>
+      </p:sp>
+      <p:sp>
+        <p:nvSpPr>
+          <p:cNvPr id="3" name="Notes Placeholder 2"/>
+          <p:cNvSpPr>
+            <a:spLocks noGrp="1"/>
+          </p:cNvSpPr>
+          <p:nvPr>
+            <p:ph type="body" idx="1"/>
+          </p:nvPr>
+        </p:nvSpPr>
+        <p:spPr/>
+        <p:txBody>
+          <a:bodyPr>
+            <a:normAutofit/>
+          </a:bodyPr>
+          <a:lstStyle/>
+          <a:p>
+            <a:endParaRPr lang="en-US" dirty="0"/>
+          </a:p>
+        </p:txBody>
+      </p:sp>
+      <p:sp>
+        <p:nvSpPr>
+          <p:cNvPr id="4" name="Header Placeholder 3"/>
+          <p:cNvSpPr>
+            <a:spLocks noGrp="1"/>
+          </p:cNvSpPr>
+          <p:nvPr>
+            <p:ph type="hdr" sz="quarter" idx="10"/>
+          </p:nvPr>
+        </p:nvSpPr>
+        <p:spPr/>
+        <p:txBody>
+          <a:bodyPr/>
+          <a:lstStyle/>
+          <a:p>
+            <a:r>
+              <a:rPr lang="en-US" smtClean="0"/>
+              <a:t>The Power Window Case Study </a:t>
+            </a:r>
+            <a:endParaRPr lang="en-US"/>
+          </a:p>
+        </p:txBody>
+      </p:sp>
+      <p:sp>
+        <p:nvSpPr>
+          <p:cNvPr id="5" name="Slide Number Placeholder 4"/>
+          <p:cNvSpPr>
+            <a:spLocks noGrp="1"/>
+          </p:cNvSpPr>
+          <p:nvPr>
+            <p:ph type="sldNum" sz="quarter" idx="11"/>
+          </p:nvPr>
+        </p:nvSpPr>
+        <p:spPr/>
+        <p:txBody>
+          <a:bodyPr/>
+          <a:lstStyle/>
+          <a:p>
+            <a:fld id="{6A27271C-0365-E644-B832-D456B5387A92}" type="slidenum">
+              <a:rPr lang="en-US" smtClean="0"/>
+              <a:pPr/>
+              <a:t>33</a:t>
+            </a:fld>
+            <a:endParaRPr lang="en-US"/>
+          </a:p>
+        </p:txBody>
+      </p:sp>
+    </p:spTree>
+  </p:cSld>
+  <p:clrMapOvr>
+    <a:masterClrMapping/>
+  </p:clrMapOvr>
+</p:notes>
+</file>
+
+<file path=ppt/notesSlides/notesSlide12.xml><?xml version="1.0" encoding="utf-8"?>
+<p:notes xmlns:a="http://schemas.openxmlformats.org/drawingml/2006/main" xmlns:r="http://schemas.openxmlformats.org/officeDocument/2006/relationships" xmlns:mc="http://schemas.openxmlformats.org/markup-compatibility/2006" xmlns:mv="urn:schemas-microsoft-com:mac:vml" xmlns:p="http://schemas.openxmlformats.org/presentationml/2006/main" mc:Ignorable="mv" mc:PreserveAttributes="mv:*">
+  <p:cSld>
+    <p:spTree>
+      <p:nvGrpSpPr>
+        <p:cNvPr id="1" name=""/>
+        <p:cNvGrpSpPr/>
+        <p:nvPr/>
+      </p:nvGrpSpPr>
+      <p:grpSpPr>
+        <a:xfrm>
+          <a:off x="0" y="0"/>
+          <a:ext cx="0" cy="0"/>
+          <a:chOff x="0" y="0"/>
+          <a:chExt cx="0" cy="0"/>
+        </a:xfrm>
+      </p:grpSpPr>
+      <p:sp>
+        <p:nvSpPr>
+          <p:cNvPr id="2" name="Slide Image Placeholder 1"/>
+          <p:cNvSpPr>
+            <a:spLocks noGrp="1" noRot="1" noChangeAspect="1"/>
+          </p:cNvSpPr>
+          <p:nvPr>
+            <p:ph type="sldImg"/>
+          </p:nvPr>
+        </p:nvSpPr>
+        <p:spPr/>
+      </p:sp>
+      <p:sp>
+        <p:nvSpPr>
+          <p:cNvPr id="3" name="Notes Placeholder 2"/>
+          <p:cNvSpPr>
+            <a:spLocks noGrp="1"/>
+          </p:cNvSpPr>
+          <p:nvPr>
+            <p:ph type="body" idx="1"/>
+          </p:nvPr>
+        </p:nvSpPr>
+        <p:spPr/>
+        <p:txBody>
+          <a:bodyPr>
+            <a:normAutofit/>
+          </a:bodyPr>
+          <a:lstStyle/>
+          <a:p>
+            <a:endParaRPr lang="en-US" dirty="0"/>
+          </a:p>
+        </p:txBody>
+      </p:sp>
+      <p:sp>
+        <p:nvSpPr>
+          <p:cNvPr id="4" name="Header Placeholder 3"/>
+          <p:cNvSpPr>
+            <a:spLocks noGrp="1"/>
+          </p:cNvSpPr>
+          <p:nvPr>
+            <p:ph type="hdr" sz="quarter" idx="10"/>
+          </p:nvPr>
+        </p:nvSpPr>
+        <p:spPr/>
+        <p:txBody>
+          <a:bodyPr/>
+          <a:lstStyle/>
+          <a:p>
+            <a:r>
+              <a:rPr lang="en-US" smtClean="0"/>
+              <a:t>The Power Window Case Study </a:t>
+            </a:r>
+            <a:endParaRPr lang="en-US"/>
+          </a:p>
+        </p:txBody>
+      </p:sp>
+      <p:sp>
+        <p:nvSpPr>
+          <p:cNvPr id="5" name="Slide Number Placeholder 4"/>
+          <p:cNvSpPr>
+            <a:spLocks noGrp="1"/>
+          </p:cNvSpPr>
+          <p:nvPr>
+            <p:ph type="sldNum" sz="quarter" idx="11"/>
+          </p:nvPr>
+        </p:nvSpPr>
+        <p:spPr/>
+        <p:txBody>
+          <a:bodyPr/>
+          <a:lstStyle/>
+          <a:p>
+            <a:fld id="{6A27271C-0365-E644-B832-D456B5387A92}" type="slidenum">
+              <a:rPr lang="en-US" smtClean="0"/>
+              <a:pPr/>
+              <a:t>34</a:t>
+            </a:fld>
+            <a:endParaRPr lang="en-US"/>
+          </a:p>
+        </p:txBody>
+      </p:sp>
+    </p:spTree>
+  </p:cSld>
+  <p:clrMapOvr>
+    <a:masterClrMapping/>
+  </p:clrMapOvr>
+</p:notes>
+</file>
+
 <file path=ppt/notesSlides/notesSlide2.xml><?xml version="1.0" encoding="utf-8"?>
 <p:notes xmlns:a="http://schemas.openxmlformats.org/drawingml/2006/main" xmlns:r="http://schemas.openxmlformats.org/officeDocument/2006/relationships" xmlns:mc="http://schemas.openxmlformats.org/markup-compatibility/2006" xmlns:mv="urn:schemas-microsoft-com:mac:vml" xmlns:p="http://schemas.openxmlformats.org/presentationml/2006/main" mc:Ignorable="mv" mc:PreserveAttributes="mv:*">
   <p:cSld>
@@ -866,7 +1189,7 @@
             <a:fld id="{6A27271C-0365-E644-B832-D456B5387A92}" type="slidenum">
               <a:rPr lang="en-US" smtClean="0"/>
               <a:pPr/>
-              <a:t>3</a:t>
+              <a:t>4</a:t>
             </a:fld>
             <a:endParaRPr lang="en-US"/>
           </a:p>
@@ -958,7 +1281,7 @@
             <a:fld id="{ED113FF2-4278-4DB0-8DB0-962ADD1A34D9}" type="slidenum">
               <a:rPr lang="en-US" smtClean="0"/>
               <a:pPr/>
-              <a:t>11</a:t>
+              <a:t>15</a:t>
             </a:fld>
             <a:endParaRPr lang="en-US"/>
           </a:p>
@@ -1040,7 +1363,7 @@
             <a:fld id="{ED113FF2-4278-4DB0-8DB0-962ADD1A34D9}" type="slidenum">
               <a:rPr lang="en-US" smtClean="0"/>
               <a:pPr/>
-              <a:t>12</a:t>
+              <a:t>16</a:t>
             </a:fld>
             <a:endParaRPr lang="en-US"/>
           </a:p>
@@ -1122,7 +1445,7 @@
             <a:fld id="{ED113FF2-4278-4DB0-8DB0-962ADD1A34D9}" type="slidenum">
               <a:rPr lang="en-US" smtClean="0"/>
               <a:pPr/>
-              <a:t>13</a:t>
+              <a:t>17</a:t>
             </a:fld>
             <a:endParaRPr lang="en-US"/>
           </a:p>
@@ -1248,7 +1571,7 @@
             <a:fld id="{ED113FF2-4278-4DB0-8DB0-962ADD1A34D9}" type="slidenum">
               <a:rPr lang="en-US" smtClean="0"/>
               <a:pPr/>
-              <a:t>14</a:t>
+              <a:t>18</a:t>
             </a:fld>
             <a:endParaRPr lang="en-US"/>
           </a:p>
@@ -1462,7 +1785,7 @@
             <a:fld id="{ED113FF2-4278-4DB0-8DB0-962ADD1A34D9}" type="slidenum">
               <a:rPr lang="en-US" smtClean="0"/>
               <a:pPr/>
-              <a:t>15</a:t>
+              <a:t>19</a:t>
             </a:fld>
             <a:endParaRPr lang="en-US"/>
           </a:p>
@@ -1676,7 +1999,7 @@
             <a:fld id="{ED113FF2-4278-4DB0-8DB0-962ADD1A34D9}" type="slidenum">
               <a:rPr lang="en-US" smtClean="0"/>
               <a:pPr/>
-              <a:t>16</a:t>
+              <a:t>20</a:t>
             </a:fld>
             <a:endParaRPr lang="en-US"/>
           </a:p>
@@ -1876,7 +2199,7 @@
             <a:fld id="{6A27271C-0365-E644-B832-D456B5387A92}" type="slidenum">
               <a:rPr lang="en-US" smtClean="0"/>
               <a:pPr/>
-              <a:t>26</a:t>
+              <a:t>31</a:t>
             </a:fld>
             <a:endParaRPr lang="en-US"/>
           </a:p>
@@ -5055,7 +5378,7 @@
             <a:pPr algn="l"/>
             <a:r>
               <a:rPr lang="en-US" sz="1200" cap="none" dirty="0" smtClean="0"/>
-              <a:t>Verification of Model Transformations</a:t>
+              <a:t>DSM-TP 2016</a:t>
             </a:r>
             <a:endParaRPr lang="en-US" sz="1200" i="1" dirty="0"/>
           </a:p>
@@ -5413,12 +5736,24 @@
               <a:rPr lang="en-US" sz="3200" cap="none" dirty="0" smtClean="0"/>
               <a:t>Verification of Model Transformations</a:t>
             </a:r>
+            <a:r>
+              <a:rPr lang="en-US" sz="3200" cap="none" dirty="0" smtClean="0"/>
+              <a:t/>
+            </a:r>
             <a:br>
               <a:rPr lang="en-US" sz="3200" cap="none" dirty="0" smtClean="0"/>
             </a:br>
             <a:r>
               <a:rPr lang="en-US" sz="2400" cap="none" dirty="0" smtClean="0"/>
-              <a:t>… and some other things</a:t>
+              <a:t>and </a:t>
+            </a:r>
+            <a:r>
+              <a:rPr lang="en-US" sz="2400" cap="none" dirty="0" err="1" smtClean="0"/>
+              <a:t>DSLs</a:t>
+            </a:r>
+            <a:r>
+              <a:rPr lang="en-US" sz="2400" cap="none" dirty="0" smtClean="0"/>
+              <a:t> in Industry</a:t>
             </a:r>
             <a:endParaRPr lang="en-US" sz="2400" cap="none" dirty="0"/>
           </a:p>
@@ -5467,13 +5802,27 @@
               <a:rPr lang="en-US" sz="1600" dirty="0" smtClean="0"/>
               <a:t>Joint work with:</a:t>
             </a:r>
-            <a:endParaRPr lang="en-US" sz="1600" dirty="0" smtClean="0"/>
           </a:p>
           <a:p>
             <a:pPr algn="ctr"/>
             <a:r>
               <a:rPr lang="en-US" sz="1600" dirty="0" smtClean="0"/>
-              <a:t>Bentley James Oakes,</a:t>
+              <a:t>Bentley James Oakes, </a:t>
+            </a:r>
+            <a:r>
+              <a:rPr lang="en-US" sz="1600" dirty="0" err="1" smtClean="0"/>
+              <a:t>Cláudio</a:t>
+            </a:r>
+            <a:r>
+              <a:rPr lang="en-US" sz="1600" dirty="0" smtClean="0"/>
+              <a:t> Gomes,</a:t>
+            </a:r>
+          </a:p>
+          <a:p>
+            <a:pPr algn="ctr"/>
+            <a:r>
+              <a:rPr lang="en-US" sz="1600" dirty="0" err="1" smtClean="0"/>
+              <a:t>Salman</a:t>
             </a:r>
             <a:r>
               <a:rPr lang="en-US" sz="1600" dirty="0" smtClean="0"/>
@@ -5481,34 +5830,11 @@
             </a:r>
             <a:r>
               <a:rPr lang="en-US" sz="1600" dirty="0" err="1" smtClean="0"/>
-              <a:t>Cláudio</a:t>
+              <a:t>Rahman</a:t>
             </a:r>
             <a:r>
               <a:rPr lang="en-US" sz="1600" dirty="0" smtClean="0"/>
-              <a:t> Gomes,</a:t>
-            </a:r>
-          </a:p>
-          <a:p>
-            <a:pPr algn="ctr"/>
-            <a:r>
-              <a:rPr lang="en-US" sz="1600" dirty="0" err="1" smtClean="0"/>
-              <a:t>Salman</a:t>
-            </a:r>
-            <a:r>
-              <a:rPr lang="en-US" sz="1600" dirty="0" smtClean="0"/>
-              <a:t> </a:t>
-            </a:r>
-            <a:r>
-              <a:rPr lang="en-US" sz="1600" dirty="0" err="1" smtClean="0"/>
-              <a:t>Rahman</a:t>
-            </a:r>
-            <a:r>
-              <a:rPr lang="en-US" sz="1600" dirty="0" smtClean="0"/>
-              <a:t> </a:t>
-            </a:r>
-            <a:r>
-              <a:rPr lang="en-US" sz="1600" dirty="0" smtClean="0"/>
-              <a:t>and Hans </a:t>
+              <a:t> and Hans </a:t>
             </a:r>
             <a:r>
               <a:rPr lang="en-US" sz="1600" dirty="0" err="1" smtClean="0"/>
@@ -5573,7 +5899,7 @@
       </p:pic>
       <p:pic>
         <p:nvPicPr>
-          <p:cNvPr id="10" name="Picture 9" descr="Screen Shot 2016-08-23 at 13.27.54.png"/>
+          <p:cNvPr id="6" name="Picture 5"/>
           <p:cNvPicPr>
             <a:picLocks noChangeAspect="1"/>
           </p:cNvPicPr>
@@ -5587,8 +5913,8 @@
         </p:blipFill>
         <p:spPr>
           <a:xfrm>
-            <a:off x="392725" y="580318"/>
-            <a:ext cx="2628900" cy="901700"/>
+            <a:off x="121394" y="347118"/>
+            <a:ext cx="8842857" cy="1068511"/>
           </a:xfrm>
           <a:prstGeom prst="rect">
             <a:avLst/>
@@ -5616,6 +5942,561 @@
 </file>
 
 <file path=ppt/slides/slide10.xml><?xml version="1.0" encoding="utf-8"?>
+<p:sld xmlns:a="http://schemas.openxmlformats.org/drawingml/2006/main" xmlns:r="http://schemas.openxmlformats.org/officeDocument/2006/relationships" xmlns:mc="http://schemas.openxmlformats.org/markup-compatibility/2006" xmlns:mv="urn:schemas-microsoft-com:mac:vml" xmlns:p="http://schemas.openxmlformats.org/presentationml/2006/main" mc:Ignorable="mv" mc:PreserveAttributes="mv:*">
+  <p:cSld>
+    <p:spTree>
+      <p:nvGrpSpPr>
+        <p:cNvPr id="1" name=""/>
+        <p:cNvGrpSpPr/>
+        <p:nvPr/>
+      </p:nvGrpSpPr>
+      <p:grpSpPr>
+        <a:xfrm>
+          <a:off x="0" y="0"/>
+          <a:ext cx="0" cy="0"/>
+          <a:chOff x="0" y="0"/>
+          <a:chExt cx="0" cy="0"/>
+        </a:xfrm>
+      </p:grpSpPr>
+      <p:sp>
+        <p:nvSpPr>
+          <p:cNvPr id="2" name="Title 1"/>
+          <p:cNvSpPr>
+            <a:spLocks noGrp="1"/>
+          </p:cNvSpPr>
+          <p:nvPr>
+            <p:ph type="title"/>
+          </p:nvPr>
+        </p:nvSpPr>
+        <p:spPr/>
+        <p:txBody>
+          <a:bodyPr/>
+          <a:lstStyle/>
+          <a:p>
+            <a:r>
+              <a:rPr lang="en-US" dirty="0" err="1" smtClean="0"/>
+              <a:t>SyVOLT</a:t>
+            </a:r>
+            <a:r>
+              <a:rPr lang="en-US" dirty="0" smtClean="0"/>
+              <a:t> is a </a:t>
+            </a:r>
+            <a:r>
+              <a:rPr lang="en-US" dirty="0" err="1" smtClean="0"/>
+              <a:t>GitHub</a:t>
+            </a:r>
+            <a:r>
+              <a:rPr lang="en-US" dirty="0" smtClean="0"/>
+              <a:t> Project</a:t>
+            </a:r>
+            <a:endParaRPr lang="en-US" dirty="0"/>
+          </a:p>
+        </p:txBody>
+      </p:sp>
+      <p:sp>
+        <p:nvSpPr>
+          <p:cNvPr id="3" name="Slide Number Placeholder 2"/>
+          <p:cNvSpPr>
+            <a:spLocks noGrp="1"/>
+          </p:cNvSpPr>
+          <p:nvPr>
+            <p:ph type="sldNum" sz="quarter" idx="12"/>
+          </p:nvPr>
+        </p:nvSpPr>
+        <p:spPr/>
+        <p:txBody>
+          <a:bodyPr/>
+          <a:lstStyle/>
+          <a:p>
+            <a:fld id="{6E2D2B3B-882E-40F3-A32F-6DD516915044}" type="slidenum">
+              <a:rPr lang="en-US" smtClean="0"/>
+              <a:pPr/>
+              <a:t>10</a:t>
+            </a:fld>
+            <a:endParaRPr lang="en-US"/>
+          </a:p>
+        </p:txBody>
+      </p:sp>
+      <p:sp>
+        <p:nvSpPr>
+          <p:cNvPr id="4" name="Rectangle 3"/>
+          <p:cNvSpPr/>
+          <p:nvPr/>
+        </p:nvSpPr>
+        <p:spPr>
+          <a:xfrm>
+            <a:off x="1251803" y="2951946"/>
+            <a:ext cx="6750566" cy="584776"/>
+          </a:xfrm>
+          <a:prstGeom prst="rect">
+            <a:avLst/>
+          </a:prstGeom>
+        </p:spPr>
+        <p:txBody>
+          <a:bodyPr wrap="none">
+            <a:spAutoFit/>
+          </a:bodyPr>
+          <a:lstStyle/>
+          <a:p>
+            <a:r>
+              <a:rPr lang="en-US" sz="3200" dirty="0" smtClean="0"/>
+              <a:t>https://</a:t>
+            </a:r>
+            <a:r>
+              <a:rPr lang="en-US" sz="3200" dirty="0" err="1" smtClean="0"/>
+              <a:t>github.com/levilucio/SyVOLT</a:t>
+            </a:r>
+            <a:r>
+              <a:rPr lang="en-US" sz="3200" dirty="0" smtClean="0"/>
+              <a:t>/</a:t>
+            </a:r>
+            <a:endParaRPr lang="en-US" sz="3200" dirty="0"/>
+          </a:p>
+        </p:txBody>
+      </p:sp>
+    </p:spTree>
+  </p:cSld>
+  <p:clrMapOvr>
+    <a:masterClrMapping/>
+  </p:clrMapOvr>
+</p:sld>
+</file>
+
+<file path=ppt/slides/slide11.xml><?xml version="1.0" encoding="utf-8"?>
+<p:sld xmlns:a="http://schemas.openxmlformats.org/drawingml/2006/main" xmlns:r="http://schemas.openxmlformats.org/officeDocument/2006/relationships" xmlns:mc="http://schemas.openxmlformats.org/markup-compatibility/2006" xmlns:mv="urn:schemas-microsoft-com:mac:vml" xmlns:p="http://schemas.openxmlformats.org/presentationml/2006/main" mc:Ignorable="mv" mc:PreserveAttributes="mv:*">
+  <p:cSld>
+    <p:spTree>
+      <p:nvGrpSpPr>
+        <p:cNvPr id="1" name=""/>
+        <p:cNvGrpSpPr/>
+        <p:nvPr/>
+      </p:nvGrpSpPr>
+      <p:grpSpPr>
+        <a:xfrm>
+          <a:off x="0" y="0"/>
+          <a:ext cx="0" cy="0"/>
+          <a:chOff x="0" y="0"/>
+          <a:chExt cx="0" cy="0"/>
+        </a:xfrm>
+      </p:grpSpPr>
+      <p:sp>
+        <p:nvSpPr>
+          <p:cNvPr id="2" name="Title 1"/>
+          <p:cNvSpPr>
+            <a:spLocks noGrp="1"/>
+          </p:cNvSpPr>
+          <p:nvPr>
+            <p:ph type="title"/>
+          </p:nvPr>
+        </p:nvSpPr>
+        <p:spPr/>
+        <p:txBody>
+          <a:bodyPr/>
+          <a:lstStyle/>
+          <a:p>
+            <a:r>
+              <a:rPr lang="en-US" dirty="0" smtClean="0"/>
+              <a:t>Talk Map</a:t>
+            </a:r>
+            <a:endParaRPr lang="en-US" dirty="0"/>
+          </a:p>
+        </p:txBody>
+      </p:sp>
+      <p:sp>
+        <p:nvSpPr>
+          <p:cNvPr id="3" name="Content Placeholder 2"/>
+          <p:cNvSpPr>
+            <a:spLocks noGrp="1"/>
+          </p:cNvSpPr>
+          <p:nvPr>
+            <p:ph idx="1"/>
+          </p:nvPr>
+        </p:nvSpPr>
+        <p:spPr/>
+        <p:txBody>
+          <a:bodyPr/>
+          <a:lstStyle/>
+          <a:p>
+            <a:r>
+              <a:rPr lang="en-US" b="1" dirty="0" smtClean="0"/>
+              <a:t>Verification of Model Transformations</a:t>
+            </a:r>
+          </a:p>
+          <a:p>
+            <a:r>
+              <a:rPr lang="en-US" dirty="0" smtClean="0"/>
+              <a:t>Current MDD projects and interaction with the industry</a:t>
+            </a:r>
+          </a:p>
+          <a:p>
+            <a:r>
+              <a:rPr lang="en-US" dirty="0" smtClean="0"/>
+              <a:t>Conclusion and Wrap-up</a:t>
+            </a:r>
+            <a:endParaRPr lang="en-US" dirty="0"/>
+          </a:p>
+        </p:txBody>
+      </p:sp>
+      <p:sp>
+        <p:nvSpPr>
+          <p:cNvPr id="4" name="Slide Number Placeholder 3"/>
+          <p:cNvSpPr>
+            <a:spLocks noGrp="1"/>
+          </p:cNvSpPr>
+          <p:nvPr>
+            <p:ph type="sldNum" sz="quarter" idx="12"/>
+          </p:nvPr>
+        </p:nvSpPr>
+        <p:spPr/>
+        <p:txBody>
+          <a:bodyPr/>
+          <a:lstStyle/>
+          <a:p>
+            <a:fld id="{6E2D2B3B-882E-40F3-A32F-6DD516915044}" type="slidenum">
+              <a:rPr lang="en-US" smtClean="0"/>
+              <a:pPr/>
+              <a:t>11</a:t>
+            </a:fld>
+            <a:endParaRPr lang="en-US"/>
+          </a:p>
+        </p:txBody>
+      </p:sp>
+    </p:spTree>
+  </p:cSld>
+  <p:clrMapOvr>
+    <a:masterClrMapping/>
+  </p:clrMapOvr>
+  <p:timing>
+    <p:tnLst>
+      <p:par>
+        <p:cTn id="1" dur="indefinite" restart="never" nodeType="tmRoot"/>
+      </p:par>
+    </p:tnLst>
+  </p:timing>
+</p:sld>
+</file>
+
+<file path=ppt/slides/slide12.xml><?xml version="1.0" encoding="utf-8"?>
+<p:sld xmlns:a="http://schemas.openxmlformats.org/drawingml/2006/main" xmlns:r="http://schemas.openxmlformats.org/officeDocument/2006/relationships" xmlns:mc="http://schemas.openxmlformats.org/markup-compatibility/2006" xmlns:mv="urn:schemas-microsoft-com:mac:vml" xmlns:p="http://schemas.openxmlformats.org/presentationml/2006/main" mc:Ignorable="mv" mc:PreserveAttributes="mv:*">
+  <p:cSld>
+    <p:spTree>
+      <p:nvGrpSpPr>
+        <p:cNvPr id="1" name=""/>
+        <p:cNvGrpSpPr/>
+        <p:nvPr/>
+      </p:nvGrpSpPr>
+      <p:grpSpPr>
+        <a:xfrm>
+          <a:off x="0" y="0"/>
+          <a:ext cx="0" cy="0"/>
+          <a:chOff x="0" y="0"/>
+          <a:chExt cx="0" cy="0"/>
+        </a:xfrm>
+      </p:grpSpPr>
+      <p:sp>
+        <p:nvSpPr>
+          <p:cNvPr id="2" name="Title 1"/>
+          <p:cNvSpPr>
+            <a:spLocks noGrp="1"/>
+          </p:cNvSpPr>
+          <p:nvPr>
+            <p:ph type="title"/>
+          </p:nvPr>
+        </p:nvSpPr>
+        <p:spPr/>
+        <p:txBody>
+          <a:bodyPr/>
+          <a:lstStyle/>
+          <a:p>
+            <a:r>
+              <a:rPr lang="en-US" dirty="0" smtClean="0"/>
+              <a:t>Talk Map</a:t>
+            </a:r>
+            <a:endParaRPr lang="en-US" dirty="0"/>
+          </a:p>
+        </p:txBody>
+      </p:sp>
+      <p:sp>
+        <p:nvSpPr>
+          <p:cNvPr id="3" name="Content Placeholder 2"/>
+          <p:cNvSpPr>
+            <a:spLocks noGrp="1"/>
+          </p:cNvSpPr>
+          <p:nvPr>
+            <p:ph idx="1"/>
+          </p:nvPr>
+        </p:nvSpPr>
+        <p:spPr>
+          <a:xfrm>
+            <a:off x="457200" y="1551355"/>
+            <a:ext cx="8341873" cy="4876800"/>
+          </a:xfrm>
+        </p:spPr>
+        <p:txBody>
+          <a:bodyPr/>
+          <a:lstStyle/>
+          <a:p>
+            <a:r>
+              <a:rPr lang="en-US" dirty="0" smtClean="0"/>
+              <a:t>Verification of Model Transformations</a:t>
+            </a:r>
+          </a:p>
+          <a:p>
+            <a:r>
+              <a:rPr lang="en-US" b="1" dirty="0" smtClean="0"/>
+              <a:t>Current MDD projects and interaction with the industry</a:t>
+            </a:r>
+          </a:p>
+          <a:p>
+            <a:r>
+              <a:rPr lang="en-US" dirty="0" smtClean="0"/>
+              <a:t>Conclusion and Wrap-up</a:t>
+            </a:r>
+            <a:endParaRPr lang="en-US" dirty="0"/>
+          </a:p>
+        </p:txBody>
+      </p:sp>
+      <p:sp>
+        <p:nvSpPr>
+          <p:cNvPr id="4" name="Slide Number Placeholder 3"/>
+          <p:cNvSpPr>
+            <a:spLocks noGrp="1"/>
+          </p:cNvSpPr>
+          <p:nvPr>
+            <p:ph type="sldNum" sz="quarter" idx="12"/>
+          </p:nvPr>
+        </p:nvSpPr>
+        <p:spPr/>
+        <p:txBody>
+          <a:bodyPr/>
+          <a:lstStyle/>
+          <a:p>
+            <a:fld id="{6E2D2B3B-882E-40F3-A32F-6DD516915044}" type="slidenum">
+              <a:rPr lang="en-US" smtClean="0"/>
+              <a:pPr/>
+              <a:t>12</a:t>
+            </a:fld>
+            <a:endParaRPr lang="en-US"/>
+          </a:p>
+        </p:txBody>
+      </p:sp>
+    </p:spTree>
+  </p:cSld>
+  <p:clrMapOvr>
+    <a:masterClrMapping/>
+  </p:clrMapOvr>
+  <p:timing>
+    <p:tnLst>
+      <p:par>
+        <p:cTn id="1" dur="indefinite" restart="never" nodeType="tmRoot"/>
+      </p:par>
+    </p:tnLst>
+  </p:timing>
+</p:sld>
+</file>
+
+<file path=ppt/slides/slide13.xml><?xml version="1.0" encoding="utf-8"?>
+<p:sld xmlns:a="http://schemas.openxmlformats.org/drawingml/2006/main" xmlns:r="http://schemas.openxmlformats.org/officeDocument/2006/relationships" xmlns:mc="http://schemas.openxmlformats.org/markup-compatibility/2006" xmlns:mv="urn:schemas-microsoft-com:mac:vml" xmlns:p="http://schemas.openxmlformats.org/presentationml/2006/main" mc:Ignorable="mv" mc:PreserveAttributes="mv:*">
+  <p:cSld>
+    <p:spTree>
+      <p:nvGrpSpPr>
+        <p:cNvPr id="1" name=""/>
+        <p:cNvGrpSpPr/>
+        <p:nvPr/>
+      </p:nvGrpSpPr>
+      <p:grpSpPr>
+        <a:xfrm>
+          <a:off x="0" y="0"/>
+          <a:ext cx="0" cy="0"/>
+          <a:chOff x="0" y="0"/>
+          <a:chExt cx="0" cy="0"/>
+        </a:xfrm>
+      </p:grpSpPr>
+      <p:sp>
+        <p:nvSpPr>
+          <p:cNvPr id="2" name="Title 1"/>
+          <p:cNvSpPr>
+            <a:spLocks noGrp="1"/>
+          </p:cNvSpPr>
+          <p:nvPr>
+            <p:ph type="title"/>
+          </p:nvPr>
+        </p:nvSpPr>
+        <p:spPr/>
+        <p:txBody>
+          <a:bodyPr/>
+          <a:lstStyle/>
+          <a:p>
+            <a:r>
+              <a:rPr lang="en-US" dirty="0" smtClean="0"/>
+              <a:t>cert-</a:t>
+            </a:r>
+            <a:r>
+              <a:rPr lang="en-US" dirty="0" err="1" smtClean="0"/>
+              <a:t>mbddr</a:t>
+            </a:r>
+            <a:r>
+              <a:rPr lang="en-US" dirty="0" smtClean="0"/>
+              <a:t> Project</a:t>
+            </a:r>
+            <a:endParaRPr lang="en-US" dirty="0"/>
+          </a:p>
+        </p:txBody>
+      </p:sp>
+      <p:sp>
+        <p:nvSpPr>
+          <p:cNvPr id="4" name="TextBox 3"/>
+          <p:cNvSpPr txBox="1"/>
+          <p:nvPr/>
+        </p:nvSpPr>
+        <p:spPr>
+          <a:xfrm>
+            <a:off x="809834" y="1475155"/>
+            <a:ext cx="7318605" cy="923330"/>
+          </a:xfrm>
+          <a:prstGeom prst="rect">
+            <a:avLst/>
+          </a:prstGeom>
+          <a:noFill/>
+        </p:spPr>
+        <p:txBody>
+          <a:bodyPr wrap="square" rtlCol="0">
+            <a:spAutoFit/>
+          </a:bodyPr>
+          <a:lstStyle/>
+          <a:p>
+            <a:r>
+              <a:rPr lang="en-US" i="1" dirty="0" err="1"/>
+              <a:t>m</a:t>
+            </a:r>
+            <a:r>
+              <a:rPr lang="en-US" i="1" dirty="0" err="1" smtClean="0"/>
+              <a:t>beddr</a:t>
+            </a:r>
+            <a:r>
+              <a:rPr lang="en-US" dirty="0" smtClean="0"/>
+              <a:t> is a set of </a:t>
+            </a:r>
+            <a:r>
+              <a:rPr lang="en-US" dirty="0" err="1" smtClean="0"/>
+              <a:t>DSLs</a:t>
+            </a:r>
+            <a:r>
+              <a:rPr lang="en-US" dirty="0" smtClean="0"/>
+              <a:t> written in MPS, to ease the writing of C code. C code is generated through a model transformation.</a:t>
+            </a:r>
+          </a:p>
+          <a:p>
+            <a:endParaRPr lang="en-US" dirty="0"/>
+          </a:p>
+        </p:txBody>
+      </p:sp>
+      <p:pic>
+        <p:nvPicPr>
+          <p:cNvPr id="15362" name="Picture 2"/>
+          <p:cNvPicPr>
+            <a:picLocks noChangeAspect="1" noChangeArrowheads="1"/>
+          </p:cNvPicPr>
+          <p:nvPr/>
+        </p:nvPicPr>
+        <p:blipFill>
+          <a:blip r:embed="rId2"/>
+          <a:srcRect/>
+          <a:stretch>
+            <a:fillRect/>
+          </a:stretch>
+        </p:blipFill>
+        <p:spPr bwMode="auto">
+          <a:xfrm>
+            <a:off x="4909694" y="6121418"/>
+            <a:ext cx="1771092" cy="547987"/>
+          </a:xfrm>
+          <a:prstGeom prst="rect">
+            <a:avLst/>
+          </a:prstGeom>
+          <a:noFill/>
+          <a:ln w="9525">
+            <a:noFill/>
+            <a:miter lim="800000"/>
+            <a:headEnd/>
+            <a:tailEnd/>
+          </a:ln>
+          <a:effectLst/>
+        </p:spPr>
+      </p:pic>
+      <p:pic>
+        <p:nvPicPr>
+          <p:cNvPr id="20" name="Picture 19" descr="mbeddr_example.png"/>
+          <p:cNvPicPr>
+            <a:picLocks noChangeAspect="1"/>
+          </p:cNvPicPr>
+          <p:nvPr/>
+        </p:nvPicPr>
+        <p:blipFill>
+          <a:blip r:embed="rId3"/>
+          <a:stretch>
+            <a:fillRect/>
+          </a:stretch>
+        </p:blipFill>
+        <p:spPr>
+          <a:xfrm>
+            <a:off x="1416238" y="2325776"/>
+            <a:ext cx="5998349" cy="3394898"/>
+          </a:xfrm>
+          <a:prstGeom prst="rect">
+            <a:avLst/>
+          </a:prstGeom>
+        </p:spPr>
+      </p:pic>
+      <p:pic>
+        <p:nvPicPr>
+          <p:cNvPr id="21" name="Picture 3"/>
+          <p:cNvPicPr>
+            <a:picLocks noChangeAspect="1" noChangeArrowheads="1"/>
+          </p:cNvPicPr>
+          <p:nvPr/>
+        </p:nvPicPr>
+        <p:blipFill>
+          <a:blip r:embed="rId4"/>
+          <a:srcRect/>
+          <a:stretch>
+            <a:fillRect/>
+          </a:stretch>
+        </p:blipFill>
+        <p:spPr bwMode="auto">
+          <a:xfrm>
+            <a:off x="2085773" y="5821180"/>
+            <a:ext cx="1741715" cy="794017"/>
+          </a:xfrm>
+          <a:prstGeom prst="rect">
+            <a:avLst/>
+          </a:prstGeom>
+          <a:noFill/>
+          <a:ln w="9525">
+            <a:noFill/>
+            <a:miter lim="800000"/>
+            <a:headEnd/>
+            <a:tailEnd/>
+          </a:ln>
+          <a:effectLst/>
+        </p:spPr>
+      </p:pic>
+    </p:spTree>
+  </p:cSld>
+  <p:clrMapOvr>
+    <a:masterClrMapping/>
+  </p:clrMapOvr>
+  <p:timing>
+    <p:tnLst>
+      <p:par>
+        <p:cTn id="1" dur="indefinite" restart="never" nodeType="tmRoot"/>
+      </p:par>
+    </p:tnLst>
+  </p:timing>
+</p:sld>
+</file>
+
+<file path=ppt/slides/slide14.xml><?xml version="1.0" encoding="utf-8"?>
 <p:sld xmlns:a="http://schemas.openxmlformats.org/drawingml/2006/main" xmlns:r="http://schemas.openxmlformats.org/officeDocument/2006/relationships" xmlns:mc="http://schemas.openxmlformats.org/markup-compatibility/2006" xmlns:mv="urn:schemas-microsoft-com:mac:vml" xmlns:p="http://schemas.openxmlformats.org/presentationml/2006/main" mc:Ignorable="mv" mc:PreserveAttributes="mv:*">
   <p:cSld>
     <p:spTree>
@@ -5897,7 +6778,7 @@
 </p:sld>
 </file>
 
-<file path=ppt/slides/slide11.xml><?xml version="1.0" encoding="utf-8"?>
+<file path=ppt/slides/slide15.xml><?xml version="1.0" encoding="utf-8"?>
 <p:sld xmlns:a="http://schemas.openxmlformats.org/drawingml/2006/main" xmlns:r="http://schemas.openxmlformats.org/officeDocument/2006/relationships" xmlns:mc="http://schemas.openxmlformats.org/markup-compatibility/2006" xmlns:mv="urn:schemas-microsoft-com:mac:vml" xmlns:p="http://schemas.openxmlformats.org/presentationml/2006/main" mc:Ignorable="mv" mc:PreserveAttributes="mv:*">
   <p:cSld>
     <p:spTree>
@@ -6041,7 +6922,7 @@
 </p:sld>
 </file>
 
-<file path=ppt/slides/slide12.xml><?xml version="1.0" encoding="utf-8"?>
+<file path=ppt/slides/slide16.xml><?xml version="1.0" encoding="utf-8"?>
 <p:sld xmlns:a="http://schemas.openxmlformats.org/drawingml/2006/main" xmlns:r="http://schemas.openxmlformats.org/officeDocument/2006/relationships" xmlns:mc="http://schemas.openxmlformats.org/markup-compatibility/2006" xmlns:mv="urn:schemas-microsoft-com:mac:vml" xmlns:p="http://schemas.openxmlformats.org/presentationml/2006/main" mc:Ignorable="mv" mc:PreserveAttributes="mv:*">
   <p:cSld>
     <p:spTree>
@@ -6379,7 +7260,7 @@
 </p:sld>
 </file>
 
-<file path=ppt/slides/slide13.xml><?xml version="1.0" encoding="utf-8"?>
+<file path=ppt/slides/slide17.xml><?xml version="1.0" encoding="utf-8"?>
 <p:sld xmlns:a="http://schemas.openxmlformats.org/drawingml/2006/main" xmlns:r="http://schemas.openxmlformats.org/officeDocument/2006/relationships" xmlns:mc="http://schemas.openxmlformats.org/markup-compatibility/2006" xmlns:mv="urn:schemas-microsoft-com:mac:vml" xmlns:p="http://schemas.openxmlformats.org/presentationml/2006/main" mc:Ignorable="mv" mc:PreserveAttributes="mv:*">
   <p:cSld>
     <p:spTree>
@@ -6567,7 +7448,7 @@
 </p:sld>
 </file>
 
-<file path=ppt/slides/slide14.xml><?xml version="1.0" encoding="utf-8"?>
+<file path=ppt/slides/slide18.xml><?xml version="1.0" encoding="utf-8"?>
 <p:sld xmlns:a="http://schemas.openxmlformats.org/drawingml/2006/main" xmlns:r="http://schemas.openxmlformats.org/officeDocument/2006/relationships" xmlns:mc="http://schemas.openxmlformats.org/markup-compatibility/2006" xmlns:mv="urn:schemas-microsoft-com:mac:vml" xmlns:p="http://schemas.openxmlformats.org/presentationml/2006/main" mc:Ignorable="mv" mc:PreserveAttributes="mv:*">
   <p:cSld>
     <p:spTree>
@@ -6626,26 +7507,31 @@
             <p:ph type="title"/>
           </p:nvPr>
         </p:nvSpPr>
-        <p:spPr/>
+        <p:spPr>
+          <a:xfrm>
+            <a:off x="502180" y="352449"/>
+            <a:ext cx="8229600" cy="990600"/>
+          </a:xfrm>
+        </p:spPr>
         <p:txBody>
           <a:bodyPr>
-            <a:normAutofit fontScale="90000"/>
+            <a:normAutofit/>
           </a:bodyPr>
           <a:lstStyle/>
           <a:p>
             <a:r>
-              <a:rPr lang="en-GB" dirty="0" smtClean="0"/>
+              <a:rPr lang="en-GB" sz="3200" dirty="0" smtClean="0"/>
               <a:t>DSLTrans </a:t>
             </a:r>
             <a:r>
-              <a:rPr lang="en-GB" dirty="0" err="1" smtClean="0"/>
+              <a:rPr lang="en-GB" sz="3200" dirty="0" err="1" smtClean="0"/>
               <a:t>mbeddr</a:t>
             </a:r>
             <a:r>
-              <a:rPr lang="en-GB" dirty="0" smtClean="0"/>
+              <a:rPr lang="en-GB" sz="3200" dirty="0" smtClean="0"/>
               <a:t> -&gt; C Transformation</a:t>
             </a:r>
-            <a:endParaRPr lang="en-US" dirty="0"/>
+            <a:endParaRPr lang="en-US" sz="3200" dirty="0"/>
           </a:p>
         </p:txBody>
       </p:sp>
@@ -6664,7 +7550,7 @@
 </p:sld>
 </file>
 
-<file path=ppt/slides/slide15.xml><?xml version="1.0" encoding="utf-8"?>
+<file path=ppt/slides/slide19.xml><?xml version="1.0" encoding="utf-8"?>
 <p:sld xmlns:a="http://schemas.openxmlformats.org/drawingml/2006/main" xmlns:r="http://schemas.openxmlformats.org/officeDocument/2006/relationships" xmlns:mc="http://schemas.openxmlformats.org/markup-compatibility/2006" xmlns:mv="urn:schemas-microsoft-com:mac:vml" xmlns:p="http://schemas.openxmlformats.org/presentationml/2006/main" mc:Ignorable="mv" mc:PreserveAttributes="mv:*">
   <p:cSld>
     <p:spTree>
@@ -6693,54 +7579,48 @@
         </p:nvSpPr>
         <p:spPr/>
         <p:txBody>
-          <a:bodyPr/>
-          <a:lstStyle/>
-          <a:p>
-            <a:r>
-              <a:rPr lang="en-GB" dirty="0" smtClean="0"/>
-              <a:t>Example contract for </a:t>
-            </a:r>
-            <a:r>
-              <a:rPr lang="en-GB" dirty="0" err="1" smtClean="0"/>
-              <a:t>mbeddr</a:t>
-            </a:r>
-            <a:endParaRPr lang="en-US" dirty="0"/>
-          </a:p>
-        </p:txBody>
-      </p:sp>
-      <p:sp>
-        <p:nvSpPr>
-          <p:cNvPr id="4" name="Content Placeholder 3"/>
-          <p:cNvSpPr>
-            <a:spLocks noGrp="1"/>
-          </p:cNvSpPr>
-          <p:nvPr>
-            <p:ph idx="1"/>
-          </p:nvPr>
-        </p:nvSpPr>
-        <p:spPr>
-          <a:xfrm>
-            <a:off x="457200" y="1355145"/>
-            <a:ext cx="8332501" cy="942111"/>
-          </a:xfrm>
-        </p:spPr>
-        <p:txBody>
           <a:bodyPr>
             <a:normAutofit/>
           </a:bodyPr>
           <a:lstStyle/>
           <a:p>
             <a:r>
-              <a:rPr lang="en-GB" dirty="0" smtClean="0">
-                <a:solidFill>
-                  <a:srgbClr val="00B050"/>
-                </a:solidFill>
-              </a:rPr>
-              <a:t>Shows</a:t>
-            </a:r>
+              <a:rPr lang="en-GB" sz="3200" dirty="0" smtClean="0"/>
+              <a:t>Example contract for </a:t>
+            </a:r>
+            <a:r>
+              <a:rPr lang="en-GB" sz="3200" dirty="0" err="1" smtClean="0"/>
+              <a:t>mbeddr</a:t>
+            </a:r>
+            <a:endParaRPr lang="en-US" sz="3200" dirty="0"/>
+          </a:p>
+        </p:txBody>
+      </p:sp>
+      <p:sp>
+        <p:nvSpPr>
+          <p:cNvPr id="4" name="Content Placeholder 3"/>
+          <p:cNvSpPr>
+            <a:spLocks noGrp="1"/>
+          </p:cNvSpPr>
+          <p:nvPr>
+            <p:ph idx="1"/>
+          </p:nvPr>
+        </p:nvSpPr>
+        <p:spPr>
+          <a:xfrm>
+            <a:off x="457200" y="1355145"/>
+            <a:ext cx="8332501" cy="942111"/>
+          </a:xfrm>
+        </p:spPr>
+        <p:txBody>
+          <a:bodyPr>
+            <a:normAutofit/>
+          </a:bodyPr>
+          <a:lstStyle/>
+          <a:p>
             <a:r>
               <a:rPr lang="en-GB" dirty="0" smtClean="0"/>
-              <a:t> that the interface of the provided port is assigned to operations of the right requiring component type.</a:t>
+              <a:t>Shows that the interface of the provided port is assigned to operations of the right requiring component type.</a:t>
             </a:r>
           </a:p>
           <a:p>
@@ -6828,7 +7708,7 @@
 </p:sld>
 </file>
 
-<file path=ppt/slides/slide16.xml><?xml version="1.0" encoding="utf-8"?>
+<file path=ppt/slides/slide2.xml><?xml version="1.0" encoding="utf-8"?>
 <p:sld xmlns:a="http://schemas.openxmlformats.org/drawingml/2006/main" xmlns:r="http://schemas.openxmlformats.org/officeDocument/2006/relationships" xmlns:mc="http://schemas.openxmlformats.org/markup-compatibility/2006" xmlns:mv="urn:schemas-microsoft-com:mac:vml" xmlns:p="http://schemas.openxmlformats.org/presentationml/2006/main" mc:Ignorable="mv" mc:PreserveAttributes="mv:*">
   <p:cSld>
     <p:spTree>
@@ -6857,22 +7737,12 @@
         </p:nvSpPr>
         <p:spPr/>
         <p:txBody>
-          <a:bodyPr>
-            <a:normAutofit fontScale="90000"/>
-          </a:bodyPr>
-          <a:lstStyle/>
-          <a:p>
-            <a:r>
-              <a:rPr lang="en-GB" dirty="0" smtClean="0"/>
-              <a:t>A correctness argument is missing several </a:t>
-            </a:r>
-            <a:r>
-              <a:rPr lang="en-GB" dirty="0" err="1" smtClean="0"/>
-              <a:t>SyVOLT</a:t>
-            </a:r>
-            <a:r>
-              <a:rPr lang="en-GB" dirty="0" smtClean="0"/>
-              <a:t> contracts more, e.g.:</a:t>
+          <a:bodyPr/>
+          <a:lstStyle/>
+          <a:p>
+            <a:r>
+              <a:rPr lang="en-US" dirty="0" smtClean="0"/>
+              <a:t>Talk Map</a:t>
             </a:r>
             <a:endParaRPr lang="en-US" dirty="0"/>
           </a:p>
@@ -6880,7 +7750,7 @@
       </p:sp>
       <p:sp>
         <p:nvSpPr>
-          <p:cNvPr id="7" name="Content Placeholder 6"/>
+          <p:cNvPr id="3" name="Content Placeholder 2"/>
           <p:cNvSpPr>
             <a:spLocks noGrp="1"/>
           </p:cNvSpPr>
@@ -6888,41 +7758,52 @@
             <p:ph idx="1"/>
           </p:nvPr>
         </p:nvSpPr>
-        <p:spPr>
-          <a:xfrm>
-            <a:off x="457200" y="1688123"/>
-            <a:ext cx="8229600" cy="4876800"/>
-          </a:xfrm>
-        </p:spPr>
+        <p:spPr/>
         <p:txBody>
           <a:bodyPr/>
           <a:lstStyle/>
           <a:p>
             <a:r>
-              <a:rPr lang="en-GB" dirty="0" smtClean="0"/>
-              <a:t>The assignment is made prior to any method call;</a:t>
-            </a:r>
-          </a:p>
-          <a:p>
-            <a:r>
-              <a:rPr lang="en-GB" dirty="0" smtClean="0"/>
-              <a:t>The correct component instance is passed to the method call (both for the source instance as well as for the target instance</a:t>
-            </a:r>
-            <a:r>
-              <a:rPr lang="en-GB" smtClean="0"/>
-              <a:t>)</a:t>
-            </a:r>
-          </a:p>
-          <a:p>
-            <a:r>
-              <a:rPr lang="en-GB" smtClean="0"/>
-              <a:t>etc</a:t>
-            </a:r>
-            <a:r>
-              <a:rPr lang="en-GB" dirty="0" smtClean="0"/>
-              <a:t>…</a:t>
+              <a:rPr lang="en-US" dirty="0" smtClean="0"/>
+              <a:t>Verification of Model Transformations</a:t>
+            </a:r>
+          </a:p>
+          <a:p>
+            <a:r>
+              <a:rPr lang="en-US" dirty="0" smtClean="0"/>
+              <a:t>Current MDD projects and interaction with the industry</a:t>
+            </a:r>
+          </a:p>
+          <a:p>
+            <a:r>
+              <a:rPr lang="en-US" dirty="0" smtClean="0"/>
+              <a:t>Conclusion and Wrap-up</a:t>
             </a:r>
             <a:endParaRPr lang="en-US" dirty="0"/>
+          </a:p>
+        </p:txBody>
+      </p:sp>
+      <p:sp>
+        <p:nvSpPr>
+          <p:cNvPr id="4" name="Slide Number Placeholder 3"/>
+          <p:cNvSpPr>
+            <a:spLocks noGrp="1"/>
+          </p:cNvSpPr>
+          <p:nvPr>
+            <p:ph type="sldNum" sz="quarter" idx="12"/>
+          </p:nvPr>
+        </p:nvSpPr>
+        <p:spPr/>
+        <p:txBody>
+          <a:bodyPr/>
+          <a:lstStyle/>
+          <a:p>
+            <a:fld id="{6E2D2B3B-882E-40F3-A32F-6DD516915044}" type="slidenum">
+              <a:rPr lang="en-US" smtClean="0"/>
+              <a:pPr/>
+              <a:t>2</a:t>
+            </a:fld>
+            <a:endParaRPr lang="en-US"/>
           </a:p>
         </p:txBody>
       </p:sp>
@@ -6941,7 +7822,7 @@
 </p:sld>
 </file>
 
-<file path=ppt/slides/slide17.xml><?xml version="1.0" encoding="utf-8"?>
+<file path=ppt/slides/slide20.xml><?xml version="1.0" encoding="utf-8"?>
 <p:sld xmlns:a="http://schemas.openxmlformats.org/drawingml/2006/main" xmlns:r="http://schemas.openxmlformats.org/officeDocument/2006/relationships" xmlns:mc="http://schemas.openxmlformats.org/markup-compatibility/2006" xmlns:mv="urn:schemas-microsoft-com:mac:vml" xmlns:p="http://schemas.openxmlformats.org/presentationml/2006/main" mc:Ignorable="mv" mc:PreserveAttributes="mv:*">
   <p:cSld>
     <p:spTree>
@@ -6971,27 +7852,140 @@
         <p:spPr/>
         <p:txBody>
           <a:bodyPr>
-            <a:normAutofit fontScale="90000"/>
+            <a:noAutofit/>
           </a:bodyPr>
           <a:lstStyle/>
           <a:p>
             <a:r>
-              <a:rPr lang="en-US" dirty="0" err="1" smtClean="0"/>
+              <a:rPr lang="en-GB" sz="3200" dirty="0" smtClean="0"/>
+              <a:t>A Correctness Argument is Missing Several </a:t>
+            </a:r>
+            <a:r>
+              <a:rPr lang="en-GB" sz="3200" dirty="0" err="1" smtClean="0"/>
               <a:t>SyVOLT</a:t>
             </a:r>
             <a:r>
-              <a:rPr lang="en-US" dirty="0" smtClean="0"/>
+              <a:rPr lang="en-GB" sz="3200" dirty="0" smtClean="0"/>
+              <a:t> Contracts more, e.g.:</a:t>
+            </a:r>
+            <a:endParaRPr lang="en-US" sz="3200" dirty="0"/>
+          </a:p>
+        </p:txBody>
+      </p:sp>
+      <p:sp>
+        <p:nvSpPr>
+          <p:cNvPr id="7" name="Content Placeholder 6"/>
+          <p:cNvSpPr>
+            <a:spLocks noGrp="1"/>
+          </p:cNvSpPr>
+          <p:nvPr>
+            <p:ph idx="1"/>
+          </p:nvPr>
+        </p:nvSpPr>
+        <p:spPr>
+          <a:xfrm>
+            <a:off x="457200" y="1688123"/>
+            <a:ext cx="8229600" cy="4876800"/>
+          </a:xfrm>
+        </p:spPr>
+        <p:txBody>
+          <a:bodyPr/>
+          <a:lstStyle/>
+          <a:p>
+            <a:r>
+              <a:rPr lang="en-GB" dirty="0" smtClean="0"/>
+              <a:t>The assignment is made prior to any method call;</a:t>
+            </a:r>
+          </a:p>
+          <a:p>
+            <a:r>
+              <a:rPr lang="en-GB" dirty="0" smtClean="0"/>
+              <a:t>The correct component instance is passed to the method call (both for the source instance as well as for the target instance</a:t>
+            </a:r>
+            <a:r>
+              <a:rPr lang="en-GB" smtClean="0"/>
+              <a:t>)</a:t>
+            </a:r>
+          </a:p>
+          <a:p>
+            <a:r>
+              <a:rPr lang="en-GB" smtClean="0"/>
+              <a:t>etc</a:t>
+            </a:r>
+            <a:r>
+              <a:rPr lang="en-GB" dirty="0" smtClean="0"/>
+              <a:t>…</a:t>
+            </a:r>
+            <a:endParaRPr lang="en-US" dirty="0"/>
+          </a:p>
+        </p:txBody>
+      </p:sp>
+    </p:spTree>
+  </p:cSld>
+  <p:clrMapOvr>
+    <a:masterClrMapping/>
+  </p:clrMapOvr>
+  <p:timing>
+    <p:tnLst>
+      <p:par>
+        <p:cTn id="1" dur="indefinite" restart="never" nodeType="tmRoot"/>
+      </p:par>
+    </p:tnLst>
+  </p:timing>
+</p:sld>
+</file>
+
+<file path=ppt/slides/slide21.xml><?xml version="1.0" encoding="utf-8"?>
+<p:sld xmlns:a="http://schemas.openxmlformats.org/drawingml/2006/main" xmlns:r="http://schemas.openxmlformats.org/officeDocument/2006/relationships" xmlns:mc="http://schemas.openxmlformats.org/markup-compatibility/2006" xmlns:mv="urn:schemas-microsoft-com:mac:vml" xmlns:p="http://schemas.openxmlformats.org/presentationml/2006/main" mc:Ignorable="mv" mc:PreserveAttributes="mv:*">
+  <p:cSld>
+    <p:spTree>
+      <p:nvGrpSpPr>
+        <p:cNvPr id="1" name=""/>
+        <p:cNvGrpSpPr/>
+        <p:nvPr/>
+      </p:nvGrpSpPr>
+      <p:grpSpPr>
+        <a:xfrm>
+          <a:off x="0" y="0"/>
+          <a:ext cx="0" cy="0"/>
+          <a:chOff x="0" y="0"/>
+          <a:chExt cx="0" cy="0"/>
+        </a:xfrm>
+      </p:grpSpPr>
+      <p:sp>
+        <p:nvSpPr>
+          <p:cNvPr id="2" name="Title 1"/>
+          <p:cNvSpPr>
+            <a:spLocks noGrp="1"/>
+          </p:cNvSpPr>
+          <p:nvPr>
+            <p:ph type="title"/>
+          </p:nvPr>
+        </p:nvSpPr>
+        <p:spPr/>
+        <p:txBody>
+          <a:bodyPr>
+            <a:noAutofit/>
+          </a:bodyPr>
+          <a:lstStyle/>
+          <a:p>
+            <a:r>
+              <a:rPr lang="en-US" sz="3200" dirty="0" err="1" smtClean="0"/>
+              <a:t>SyVOLT</a:t>
+            </a:r>
+            <a:r>
+              <a:rPr lang="en-US" sz="3200" dirty="0" smtClean="0"/>
               <a:t> Optimizations for analyzing the C generator for </a:t>
             </a:r>
             <a:r>
-              <a:rPr lang="en-US" dirty="0" err="1" smtClean="0"/>
+              <a:rPr lang="en-US" sz="3200" dirty="0" err="1" smtClean="0"/>
               <a:t>mbeddr</a:t>
             </a:r>
             <a:r>
-              <a:rPr lang="en-US" dirty="0" smtClean="0"/>
+              <a:rPr lang="en-US" sz="3200" dirty="0" smtClean="0"/>
               <a:t> </a:t>
             </a:r>
-            <a:endParaRPr lang="en-US" dirty="0"/>
+            <a:endParaRPr lang="en-US" sz="3200" dirty="0"/>
           </a:p>
         </p:txBody>
       </p:sp>
@@ -7084,7 +8078,7 @@
             <a:fld id="{6E2D2B3B-882E-40F3-A32F-6DD516915044}" type="slidenum">
               <a:rPr lang="en-US" smtClean="0"/>
               <a:pPr/>
-              <a:t>17</a:t>
+              <a:t>21</a:t>
             </a:fld>
             <a:endParaRPr lang="en-US"/>
           </a:p>
@@ -7327,7 +8321,7 @@
 </p:sld>
 </file>
 
-<file path=ppt/slides/slide18.xml><?xml version="1.0" encoding="utf-8"?>
+<file path=ppt/slides/slide22.xml><?xml version="1.0" encoding="utf-8"?>
 <p:sld xmlns:a="http://schemas.openxmlformats.org/drawingml/2006/main" xmlns:r="http://schemas.openxmlformats.org/officeDocument/2006/relationships" xmlns:mc="http://schemas.openxmlformats.org/markup-compatibility/2006" xmlns:mv="urn:schemas-microsoft-com:mac:vml" xmlns:p="http://schemas.openxmlformats.org/presentationml/2006/main" mc:Ignorable="mv" mc:PreserveAttributes="mv:*">
   <p:cSld>
     <p:spTree>
@@ -7357,38 +8351,27 @@
         <p:spPr/>
         <p:txBody>
           <a:bodyPr>
-            <a:normAutofit fontScale="90000"/>
+            <a:noAutofit/>
           </a:bodyPr>
           <a:lstStyle/>
           <a:p>
             <a:r>
-              <a:rPr lang="en-US" dirty="0" err="1" smtClean="0"/>
+              <a:rPr lang="en-US" sz="3200" dirty="0" err="1" smtClean="0"/>
               <a:t>DSLTrans</a:t>
             </a:r>
             <a:r>
-              <a:rPr lang="en-US" dirty="0" smtClean="0"/>
+              <a:rPr lang="en-US" sz="3200" dirty="0" smtClean="0"/>
               <a:t> and </a:t>
             </a:r>
             <a:r>
-              <a:rPr lang="en-US" dirty="0" err="1" smtClean="0"/>
+              <a:rPr lang="en-US" sz="3200" dirty="0" err="1" smtClean="0"/>
               <a:t>SyVOLT</a:t>
             </a:r>
             <a:r>
-              <a:rPr lang="en-US" dirty="0" smtClean="0"/>
-              <a:t>:</a:t>
-            </a:r>
-            <a:br>
-              <a:rPr lang="en-US" dirty="0" smtClean="0"/>
-            </a:br>
-            <a:r>
-              <a:rPr lang="en-US" dirty="0" smtClean="0"/>
-              <a:t>From </a:t>
-            </a:r>
-            <a:r>
-              <a:rPr lang="en-US" dirty="0" smtClean="0"/>
-              <a:t>Eclipse to MPS</a:t>
-            </a:r>
-            <a:endParaRPr lang="en-US" dirty="0"/>
+              <a:rPr lang="en-US" sz="3200" dirty="0" smtClean="0"/>
+              <a:t>: From Eclipse to MPS</a:t>
+            </a:r>
+            <a:endParaRPr lang="en-US" sz="3200" dirty="0"/>
           </a:p>
         </p:txBody>
       </p:sp>
@@ -7456,11 +8439,7 @@
           <a:p>
             <a:r>
               <a:rPr lang="en-US" dirty="0" smtClean="0"/>
-              <a:t>Part of </a:t>
-            </a:r>
-            <a:r>
-              <a:rPr lang="en-US" dirty="0" smtClean="0"/>
-              <a:t>the cert-</a:t>
+              <a:t>Part of the cert-</a:t>
             </a:r>
             <a:r>
               <a:rPr lang="en-US" dirty="0" err="1" smtClean="0"/>
@@ -7525,7 +8504,7 @@
             <a:fld id="{6E2D2B3B-882E-40F3-A32F-6DD516915044}" type="slidenum">
               <a:rPr lang="en-US" smtClean="0"/>
               <a:pPr/>
-              <a:t>18</a:t>
+              <a:t>22</a:t>
             </a:fld>
             <a:endParaRPr lang="en-US"/>
           </a:p>
@@ -7546,7 +8525,7 @@
 </p:sld>
 </file>
 
-<file path=ppt/slides/slide19.xml><?xml version="1.0" encoding="utf-8"?>
+<file path=ppt/slides/slide23.xml><?xml version="1.0" encoding="utf-8"?>
 <p:sld xmlns:a="http://schemas.openxmlformats.org/drawingml/2006/main" xmlns:r="http://schemas.openxmlformats.org/officeDocument/2006/relationships" xmlns:mc="http://schemas.openxmlformats.org/markup-compatibility/2006" xmlns:mv="urn:schemas-microsoft-com:mac:vml" xmlns:p="http://schemas.openxmlformats.org/presentationml/2006/main" mc:Ignorable="mv" mc:PreserveAttributes="mv:*">
   <p:cSld>
     <p:spTree>
@@ -7565,7 +8544,64 @@
       </p:grpSpPr>
       <p:sp>
         <p:nvSpPr>
-          <p:cNvPr id="3" name="Slide Number Placeholder 2"/>
+          <p:cNvPr id="2" name="Title 1"/>
+          <p:cNvSpPr>
+            <a:spLocks noGrp="1"/>
+          </p:cNvSpPr>
+          <p:nvPr>
+            <p:ph type="title"/>
+          </p:nvPr>
+        </p:nvSpPr>
+        <p:spPr/>
+        <p:txBody>
+          <a:bodyPr/>
+          <a:lstStyle/>
+          <a:p>
+            <a:r>
+              <a:rPr lang="en-US" dirty="0" err="1" smtClean="0"/>
+              <a:t>DSLs</a:t>
+            </a:r>
+            <a:r>
+              <a:rPr lang="en-US" dirty="0" smtClean="0"/>
+              <a:t> in MPS</a:t>
+            </a:r>
+            <a:endParaRPr lang="en-US" dirty="0"/>
+          </a:p>
+        </p:txBody>
+      </p:sp>
+      <p:sp>
+        <p:nvSpPr>
+          <p:cNvPr id="3" name="Content Placeholder 2"/>
+          <p:cNvSpPr>
+            <a:spLocks noGrp="1"/>
+          </p:cNvSpPr>
+          <p:nvPr>
+            <p:ph idx="1"/>
+          </p:nvPr>
+        </p:nvSpPr>
+        <p:spPr/>
+        <p:txBody>
+          <a:bodyPr/>
+          <a:lstStyle/>
+          <a:p>
+            <a:r>
+              <a:rPr lang="en-US" dirty="0" smtClean="0"/>
+              <a:t>Highlight </a:t>
+            </a:r>
+            <a:r>
+              <a:rPr lang="en-US" dirty="0" err="1" smtClean="0"/>
+              <a:t>projectional</a:t>
+            </a:r>
+            <a:r>
+              <a:rPr lang="en-US" dirty="0" smtClean="0"/>
+              <a:t> editing</a:t>
+            </a:r>
+          </a:p>
+        </p:txBody>
+      </p:sp>
+      <p:sp>
+        <p:nvSpPr>
+          <p:cNvPr id="4" name="Slide Number Placeholder 3"/>
           <p:cNvSpPr>
             <a:spLocks noGrp="1"/>
           </p:cNvSpPr>
@@ -7581,7 +8617,56 @@
             <a:fld id="{6E2D2B3B-882E-40F3-A32F-6DD516915044}" type="slidenum">
               <a:rPr lang="en-US" smtClean="0"/>
               <a:pPr/>
-              <a:t>19</a:t>
+              <a:t>23</a:t>
+            </a:fld>
+            <a:endParaRPr lang="en-US"/>
+          </a:p>
+        </p:txBody>
+      </p:sp>
+    </p:spTree>
+  </p:cSld>
+  <p:clrMapOvr>
+    <a:masterClrMapping/>
+  </p:clrMapOvr>
+</p:sld>
+</file>
+
+<file path=ppt/slides/slide24.xml><?xml version="1.0" encoding="utf-8"?>
+<p:sld xmlns:a="http://schemas.openxmlformats.org/drawingml/2006/main" xmlns:r="http://schemas.openxmlformats.org/officeDocument/2006/relationships" xmlns:mc="http://schemas.openxmlformats.org/markup-compatibility/2006" xmlns:mv="urn:schemas-microsoft-com:mac:vml" xmlns:p="http://schemas.openxmlformats.org/presentationml/2006/main" mc:Ignorable="mv" mc:PreserveAttributes="mv:*">
+  <p:cSld>
+    <p:spTree>
+      <p:nvGrpSpPr>
+        <p:cNvPr id="1" name=""/>
+        <p:cNvGrpSpPr/>
+        <p:nvPr/>
+      </p:nvGrpSpPr>
+      <p:grpSpPr>
+        <a:xfrm>
+          <a:off x="0" y="0"/>
+          <a:ext cx="0" cy="0"/>
+          <a:chOff x="0" y="0"/>
+          <a:chExt cx="0" cy="0"/>
+        </a:xfrm>
+      </p:grpSpPr>
+      <p:sp>
+        <p:nvSpPr>
+          <p:cNvPr id="3" name="Slide Number Placeholder 2"/>
+          <p:cNvSpPr>
+            <a:spLocks noGrp="1"/>
+          </p:cNvSpPr>
+          <p:nvPr>
+            <p:ph type="sldNum" sz="quarter" idx="12"/>
+          </p:nvPr>
+        </p:nvSpPr>
+        <p:spPr/>
+        <p:txBody>
+          <a:bodyPr/>
+          <a:lstStyle/>
+          <a:p>
+            <a:fld id="{6E2D2B3B-882E-40F3-A32F-6DD516915044}" type="slidenum">
+              <a:rPr lang="en-US" smtClean="0"/>
+              <a:pPr/>
+              <a:t>24</a:t>
             </a:fld>
             <a:endParaRPr lang="en-US"/>
           </a:p>
@@ -7619,19 +8704,7 @@
             </a:br>
             <a:r>
               <a:rPr lang="en-US" sz="3200" dirty="0" smtClean="0"/>
-              <a:t>L</a:t>
-            </a:r>
-            <a:r>
-              <a:rPr lang="en-US" sz="3200" dirty="0" smtClean="0"/>
-              <a:t>ive </a:t>
-            </a:r>
-            <a:r>
-              <a:rPr lang="en-US" sz="3200" dirty="0" smtClean="0"/>
-              <a:t>D</a:t>
-            </a:r>
-            <a:r>
-              <a:rPr lang="en-US" sz="3200" dirty="0" smtClean="0"/>
-              <a:t>emo of MPS</a:t>
+              <a:t>Live Demo of MPS</a:t>
             </a:r>
             <a:endParaRPr lang="en-US" sz="3200" dirty="0"/>
           </a:p>
@@ -7686,7 +8759,7 @@
 </p:sld>
 </file>
 
-<file path=ppt/slides/slide2.xml><?xml version="1.0" encoding="utf-8"?>
+<file path=ppt/slides/slide25.xml><?xml version="1.0" encoding="utf-8"?>
 <p:sld xmlns:a="http://schemas.openxmlformats.org/drawingml/2006/main" xmlns:r="http://schemas.openxmlformats.org/officeDocument/2006/relationships" xmlns:mc="http://schemas.openxmlformats.org/markup-compatibility/2006" xmlns:mv="urn:schemas-microsoft-com:mac:vml" xmlns:p="http://schemas.openxmlformats.org/presentationml/2006/main" mc:Ignorable="mv" mc:PreserveAttributes="mv:*">
   <p:cSld>
     <p:spTree>
@@ -7715,52 +8788,73 @@
         </p:nvSpPr>
         <p:spPr/>
         <p:txBody>
+          <a:bodyPr>
+            <a:noAutofit/>
+          </a:bodyPr>
+          <a:lstStyle/>
+          <a:p>
+            <a:r>
+              <a:rPr lang="en-US" sz="3200" dirty="0" smtClean="0"/>
+              <a:t>Something (a bit) different: The IETS3 Project</a:t>
+            </a:r>
+            <a:endParaRPr lang="en-US" sz="3200" dirty="0"/>
+          </a:p>
+        </p:txBody>
+      </p:sp>
+      <p:sp>
+        <p:nvSpPr>
+          <p:cNvPr id="3" name="Content Placeholder 2"/>
+          <p:cNvSpPr>
+            <a:spLocks noGrp="1"/>
+          </p:cNvSpPr>
+          <p:nvPr>
+            <p:ph idx="1"/>
+          </p:nvPr>
+        </p:nvSpPr>
+        <p:spPr/>
+        <p:txBody>
           <a:bodyPr/>
           <a:lstStyle/>
           <a:p>
             <a:r>
               <a:rPr lang="en-US" dirty="0" smtClean="0"/>
-              <a:t>Talk Map</a:t>
-            </a:r>
-            <a:endParaRPr lang="en-US" dirty="0"/>
-          </a:p>
-        </p:txBody>
-      </p:sp>
-      <p:sp>
-        <p:nvSpPr>
-          <p:cNvPr id="3" name="Content Placeholder 2"/>
-          <p:cNvSpPr>
-            <a:spLocks noGrp="1"/>
-          </p:cNvSpPr>
-          <p:nvPr>
-            <p:ph idx="1"/>
-          </p:nvPr>
-        </p:nvSpPr>
-        <p:spPr/>
-        <p:txBody>
-          <a:bodyPr/>
-          <a:lstStyle/>
+              <a:t>Requirement management is difficult for critical systems</a:t>
+            </a:r>
+          </a:p>
           <a:p>
             <a:r>
               <a:rPr lang="en-US" dirty="0" smtClean="0"/>
-              <a:t>Verification of Model Transformations</a:t>
+              <a:t>Especially critical for the Aerospace and Automotive industry</a:t>
             </a:r>
           </a:p>
           <a:p>
             <a:r>
               <a:rPr lang="en-US" dirty="0" smtClean="0"/>
-              <a:t>Interaction with the industry (current projects)</a:t>
-            </a:r>
-          </a:p>
-          <a:p>
-            <a:r>
-              <a:rPr lang="en-US" smtClean="0"/>
-              <a:t>Conclusion and Wrap</a:t>
-            </a:r>
+              <a:t>Compliance with standards is required (e.g. DO-178C in aerospace)</a:t>
+            </a:r>
+          </a:p>
+          <a:p>
             <a:r>
               <a:rPr lang="en-US" dirty="0" smtClean="0"/>
-              <a:t>-up</a:t>
-            </a:r>
+              <a:t>Traceability is required from High Level Requirements to Low Level requirements to code</a:t>
+            </a:r>
+          </a:p>
+          <a:p>
+            <a:r>
+              <a:rPr lang="en-US" dirty="0" smtClean="0"/>
+              <a:t>There is space for improvement </a:t>
+            </a:r>
+            <a:r>
+              <a:rPr lang="en-US" dirty="0" err="1" smtClean="0"/>
+              <a:t>wrt</a:t>
+            </a:r>
+            <a:r>
+              <a:rPr lang="en-US" dirty="0" smtClean="0"/>
+              <a:t>. currently used tools: DOORS, Word, Excel, Enterprise Architect,…</a:t>
+            </a:r>
+          </a:p>
+          <a:p>
+            <a:pPr lvl="1"/>
             <a:endParaRPr lang="en-US" dirty="0"/>
           </a:p>
         </p:txBody>
@@ -7783,162 +8877,7 @@
             <a:fld id="{6E2D2B3B-882E-40F3-A32F-6DD516915044}" type="slidenum">
               <a:rPr lang="en-US" smtClean="0"/>
               <a:pPr/>
-              <a:t>2</a:t>
-            </a:fld>
-            <a:endParaRPr lang="en-US"/>
-          </a:p>
-        </p:txBody>
-      </p:sp>
-    </p:spTree>
-  </p:cSld>
-  <p:clrMapOvr>
-    <a:masterClrMapping/>
-  </p:clrMapOvr>
-</p:sld>
-</file>
-
-<file path=ppt/slides/slide20.xml><?xml version="1.0" encoding="utf-8"?>
-<p:sld xmlns:a="http://schemas.openxmlformats.org/drawingml/2006/main" xmlns:r="http://schemas.openxmlformats.org/officeDocument/2006/relationships" xmlns:mc="http://schemas.openxmlformats.org/markup-compatibility/2006" xmlns:mv="urn:schemas-microsoft-com:mac:vml" xmlns:p="http://schemas.openxmlformats.org/presentationml/2006/main" mc:Ignorable="mv" mc:PreserveAttributes="mv:*">
-  <p:cSld>
-    <p:spTree>
-      <p:nvGrpSpPr>
-        <p:cNvPr id="1" name=""/>
-        <p:cNvGrpSpPr/>
-        <p:nvPr/>
-      </p:nvGrpSpPr>
-      <p:grpSpPr>
-        <a:xfrm>
-          <a:off x="0" y="0"/>
-          <a:ext cx="0" cy="0"/>
-          <a:chOff x="0" y="0"/>
-          <a:chExt cx="0" cy="0"/>
-        </a:xfrm>
-      </p:grpSpPr>
-      <p:sp>
-        <p:nvSpPr>
-          <p:cNvPr id="2" name="Title 1"/>
-          <p:cNvSpPr>
-            <a:spLocks noGrp="1"/>
-          </p:cNvSpPr>
-          <p:nvPr>
-            <p:ph type="title"/>
-          </p:nvPr>
-        </p:nvSpPr>
-        <p:spPr/>
-        <p:txBody>
-          <a:bodyPr>
-            <a:normAutofit fontScale="90000"/>
-          </a:bodyPr>
-          <a:lstStyle/>
-          <a:p>
-            <a:r>
-              <a:rPr lang="en-US" dirty="0" smtClean="0"/>
-              <a:t>Something (a bit) different:</a:t>
-            </a:r>
-            <a:br>
-              <a:rPr lang="en-US" dirty="0" smtClean="0"/>
-            </a:br>
-            <a:r>
-              <a:rPr lang="en-US" dirty="0" smtClean="0"/>
-              <a:t>The IETS3 project</a:t>
-            </a:r>
-            <a:endParaRPr lang="en-US" dirty="0"/>
-          </a:p>
-        </p:txBody>
-      </p:sp>
-      <p:sp>
-        <p:nvSpPr>
-          <p:cNvPr id="3" name="Content Placeholder 2"/>
-          <p:cNvSpPr>
-            <a:spLocks noGrp="1"/>
-          </p:cNvSpPr>
-          <p:nvPr>
-            <p:ph idx="1"/>
-          </p:nvPr>
-        </p:nvSpPr>
-        <p:spPr/>
-        <p:txBody>
-          <a:bodyPr/>
-          <a:lstStyle/>
-          <a:p>
-            <a:r>
-              <a:rPr lang="en-US" dirty="0" smtClean="0"/>
-              <a:t>Requirement management is difficult for critical systems</a:t>
-            </a:r>
-          </a:p>
-          <a:p>
-            <a:r>
-              <a:rPr lang="en-US" dirty="0" smtClean="0"/>
-              <a:t>Especially critical for the Aerospace and Automotive </a:t>
-            </a:r>
-            <a:r>
-              <a:rPr lang="en-US" dirty="0" smtClean="0"/>
-              <a:t>industry</a:t>
-            </a:r>
-          </a:p>
-          <a:p>
-            <a:r>
-              <a:rPr lang="en-US" dirty="0" smtClean="0"/>
-              <a:t>Compliance with standards is required (e.g. DO-178C</a:t>
-            </a:r>
-            <a:r>
-              <a:rPr lang="en-US" dirty="0" smtClean="0"/>
-              <a:t> in </a:t>
-            </a:r>
-            <a:r>
-              <a:rPr lang="en-US" dirty="0" smtClean="0"/>
-              <a:t>aerospace</a:t>
-            </a:r>
-            <a:r>
-              <a:rPr lang="en-US" dirty="0" smtClean="0"/>
-              <a:t>)</a:t>
-            </a:r>
-          </a:p>
-          <a:p>
-            <a:r>
-              <a:rPr lang="en-US" dirty="0" smtClean="0"/>
-              <a:t>Traceability is required from High Level Requirements to Low Level requirements to code</a:t>
-            </a:r>
-          </a:p>
-          <a:p>
-            <a:r>
-              <a:rPr lang="en-US" dirty="0" smtClean="0"/>
-              <a:t>There is space for improvement </a:t>
-            </a:r>
-            <a:r>
-              <a:rPr lang="en-US" dirty="0" err="1" smtClean="0"/>
-              <a:t>wrt</a:t>
-            </a:r>
-            <a:r>
-              <a:rPr lang="en-US" dirty="0" smtClean="0"/>
-              <a:t>. currently used tools: DOORS, Word, Excel, Enterprise Architect,…</a:t>
-            </a:r>
-          </a:p>
-          <a:p>
-            <a:pPr lvl="1"/>
-            <a:endParaRPr lang="en-US" dirty="0"/>
-          </a:p>
-        </p:txBody>
-      </p:sp>
-      <p:sp>
-        <p:nvSpPr>
-          <p:cNvPr id="4" name="Slide Number Placeholder 3"/>
-          <p:cNvSpPr>
-            <a:spLocks noGrp="1"/>
-          </p:cNvSpPr>
-          <p:nvPr>
-            <p:ph type="sldNum" sz="quarter" idx="12"/>
-          </p:nvPr>
-        </p:nvSpPr>
-        <p:spPr/>
-        <p:txBody>
-          <a:bodyPr/>
-          <a:lstStyle/>
-          <a:p>
-            <a:fld id="{6E2D2B3B-882E-40F3-A32F-6DD516915044}" type="slidenum">
-              <a:rPr lang="en-US" smtClean="0"/>
-              <a:pPr/>
-              <a:t>20</a:t>
+              <a:t>25</a:t>
             </a:fld>
             <a:endParaRPr lang="en-US"/>
           </a:p>
@@ -8048,10 +8987,17 @@
   <p:clrMapOvr>
     <a:masterClrMapping/>
   </p:clrMapOvr>
+  <p:timing>
+    <p:tnLst>
+      <p:par>
+        <p:cTn id="1" dur="indefinite" restart="never" nodeType="tmRoot"/>
+      </p:par>
+    </p:tnLst>
+  </p:timing>
 </p:sld>
 </file>
 
-<file path=ppt/slides/slide21.xml><?xml version="1.0" encoding="utf-8"?>
+<file path=ppt/slides/slide26.xml><?xml version="1.0" encoding="utf-8"?>
 <p:sld xmlns:a="http://schemas.openxmlformats.org/drawingml/2006/main" xmlns:r="http://schemas.openxmlformats.org/officeDocument/2006/relationships" xmlns:mc="http://schemas.openxmlformats.org/markup-compatibility/2006" xmlns:mv="urn:schemas-microsoft-com:mac:vml" xmlns:p="http://schemas.openxmlformats.org/presentationml/2006/main" mc:Ignorable="mv" mc:PreserveAttributes="mv:*">
   <p:cSld>
     <p:spTree>
@@ -8161,7 +9107,7 @@
             <a:fld id="{6E2D2B3B-882E-40F3-A32F-6DD516915044}" type="slidenum">
               <a:rPr lang="en-US" smtClean="0"/>
               <a:pPr/>
-              <a:t>21</a:t>
+              <a:t>26</a:t>
             </a:fld>
             <a:endParaRPr lang="en-US"/>
           </a:p>
@@ -8172,10 +9118,17 @@
   <p:clrMapOvr>
     <a:masterClrMapping/>
   </p:clrMapOvr>
+  <p:timing>
+    <p:tnLst>
+      <p:par>
+        <p:cTn id="1" dur="indefinite" restart="never" nodeType="tmRoot"/>
+      </p:par>
+    </p:tnLst>
+  </p:timing>
 </p:sld>
 </file>
 
-<file path=ppt/slides/slide22.xml><?xml version="1.0" encoding="utf-8"?>
+<file path=ppt/slides/slide27.xml><?xml version="1.0" encoding="utf-8"?>
 <p:sld xmlns:a="http://schemas.openxmlformats.org/drawingml/2006/main" xmlns:r="http://schemas.openxmlformats.org/officeDocument/2006/relationships" xmlns:mc="http://schemas.openxmlformats.org/markup-compatibility/2006" xmlns:mv="urn:schemas-microsoft-com:mac:vml" xmlns:p="http://schemas.openxmlformats.org/presentationml/2006/main" mc:Ignorable="mv" mc:PreserveAttributes="mv:*">
   <p:cSld>
     <p:spTree>
@@ -8233,7 +9186,7 @@
             <a:fld id="{6E2D2B3B-882E-40F3-A32F-6DD516915044}" type="slidenum">
               <a:rPr lang="en-US" smtClean="0"/>
               <a:pPr/>
-              <a:t>22</a:t>
+              <a:t>27</a:t>
             </a:fld>
             <a:endParaRPr lang="en-US"/>
           </a:p>
@@ -8276,10 +9229,17 @@
   <p:clrMapOvr>
     <a:masterClrMapping/>
   </p:clrMapOvr>
+  <p:timing>
+    <p:tnLst>
+      <p:par>
+        <p:cTn id="1" dur="indefinite" restart="never" nodeType="tmRoot"/>
+      </p:par>
+    </p:tnLst>
+  </p:timing>
 </p:sld>
 </file>
 
-<file path=ppt/slides/slide23.xml><?xml version="1.0" encoding="utf-8"?>
+<file path=ppt/slides/slide28.xml><?xml version="1.0" encoding="utf-8"?>
 <p:sld xmlns:a="http://schemas.openxmlformats.org/drawingml/2006/main" xmlns:r="http://schemas.openxmlformats.org/officeDocument/2006/relationships" xmlns:mc="http://schemas.openxmlformats.org/markup-compatibility/2006" xmlns:mv="urn:schemas-microsoft-com:mac:vml" xmlns:p="http://schemas.openxmlformats.org/presentationml/2006/main" mc:Ignorable="mv" mc:PreserveAttributes="mv:*">
   <p:cSld>
     <p:spTree>
@@ -8314,7 +9274,7 @@
             <a:fld id="{6E2D2B3B-882E-40F3-A32F-6DD516915044}" type="slidenum">
               <a:rPr lang="en-US" smtClean="0"/>
               <a:pPr/>
-              <a:t>23</a:t>
+              <a:t>28</a:t>
             </a:fld>
             <a:endParaRPr lang="en-US"/>
           </a:p>
@@ -8352,19 +9312,7 @@
             </a:br>
             <a:r>
               <a:rPr lang="en-US" sz="3200" dirty="0" smtClean="0"/>
-              <a:t>L</a:t>
-            </a:r>
-            <a:r>
-              <a:rPr lang="en-US" sz="3200" dirty="0" smtClean="0"/>
-              <a:t>ive </a:t>
-            </a:r>
-            <a:r>
-              <a:rPr lang="en-US" sz="3200" dirty="0" smtClean="0"/>
-              <a:t>D</a:t>
-            </a:r>
-            <a:r>
-              <a:rPr lang="en-US" sz="3200" dirty="0" smtClean="0"/>
-              <a:t>emo of IETS3</a:t>
+              <a:t>Live Demo of IETS3</a:t>
             </a:r>
             <a:endParaRPr lang="en-US" sz="3200" dirty="0"/>
           </a:p>
@@ -8386,7 +9334,7 @@
 </p:sld>
 </file>
 
-<file path=ppt/slides/slide24.xml><?xml version="1.0" encoding="utf-8"?>
+<file path=ppt/slides/slide29.xml><?xml version="1.0" encoding="utf-8"?>
 <p:sld xmlns:a="http://schemas.openxmlformats.org/drawingml/2006/main" xmlns:r="http://schemas.openxmlformats.org/officeDocument/2006/relationships" xmlns:mc="http://schemas.openxmlformats.org/markup-compatibility/2006" xmlns:mv="urn:schemas-microsoft-com:mac:vml" xmlns:p="http://schemas.openxmlformats.org/presentationml/2006/main" mc:Ignorable="mv" mc:PreserveAttributes="mv:*">
   <p:cSld>
     <p:spTree>
@@ -8422,23 +9370,7 @@
           <a:p>
             <a:r>
               <a:rPr lang="en-US" dirty="0" smtClean="0"/>
-              <a:t>IETS3: How can Modeling Technology </a:t>
-            </a:r>
-            <a:r>
-              <a:rPr lang="en-US" dirty="0" smtClean="0"/>
-              <a:t>H</a:t>
-            </a:r>
-            <a:r>
-              <a:rPr lang="en-US" dirty="0" smtClean="0"/>
-              <a:t>elp in Requirements </a:t>
-            </a:r>
-            <a:r>
-              <a:rPr lang="en-US" dirty="0" smtClean="0"/>
-              <a:t>E</a:t>
-            </a:r>
-            <a:r>
-              <a:rPr lang="en-US" dirty="0" smtClean="0"/>
-              <a:t>ngineering?</a:t>
+              <a:t>IETS3: How can Modeling Technology Help in Requirements Engineering?</a:t>
             </a:r>
             <a:endParaRPr lang="en-US" dirty="0"/>
           </a:p>
@@ -8467,11 +9399,7 @@
           <a:p>
             <a:r>
               <a:rPr lang="en-US" dirty="0" smtClean="0"/>
-              <a:t>A requirements document becomes an interconnected model where traceability is provided by </a:t>
-            </a:r>
-            <a:r>
-              <a:rPr lang="en-US" dirty="0" smtClean="0"/>
-              <a:t>construction</a:t>
+              <a:t>A requirements document becomes an interconnected model where traceability is provided by construction</a:t>
             </a:r>
           </a:p>
           <a:p>
@@ -8521,7 +9449,7 @@
             <a:fld id="{6E2D2B3B-882E-40F3-A32F-6DD516915044}" type="slidenum">
               <a:rPr lang="en-US" smtClean="0"/>
               <a:pPr/>
-              <a:t>24</a:t>
+              <a:t>29</a:t>
             </a:fld>
             <a:endParaRPr lang="en-US"/>
           </a:p>
@@ -8532,10 +9460,17 @@
   <p:clrMapOvr>
     <a:masterClrMapping/>
   </p:clrMapOvr>
+  <p:timing>
+    <p:tnLst>
+      <p:par>
+        <p:cTn id="1" dur="indefinite" restart="never" nodeType="tmRoot"/>
+      </p:par>
+    </p:tnLst>
+  </p:timing>
 </p:sld>
 </file>
 
-<file path=ppt/slides/slide25.xml><?xml version="1.0" encoding="utf-8"?>
+<file path=ppt/slides/slide3.xml><?xml version="1.0" encoding="utf-8"?>
 <p:sld xmlns:a="http://schemas.openxmlformats.org/drawingml/2006/main" xmlns:r="http://schemas.openxmlformats.org/officeDocument/2006/relationships" xmlns:mc="http://schemas.openxmlformats.org/markup-compatibility/2006" xmlns:mv="urn:schemas-microsoft-com:mac:vml" xmlns:p="http://schemas.openxmlformats.org/presentationml/2006/main" mc:Ignorable="mv" mc:PreserveAttributes="mv:*">
   <p:cSld>
     <p:spTree>
@@ -8569,7 +9504,7 @@
           <a:p>
             <a:r>
               <a:rPr lang="en-US" dirty="0" smtClean="0"/>
-              <a:t>Conclusion</a:t>
+              <a:t>Talk Map</a:t>
             </a:r>
             <a:endParaRPr lang="en-US" dirty="0"/>
           </a:p>
@@ -8591,50 +9526,21 @@
           <a:lstStyle/>
           <a:p>
             <a:r>
+              <a:rPr lang="en-US" b="1" dirty="0" smtClean="0"/>
+              <a:t>Verification of Model Transformations</a:t>
+            </a:r>
+          </a:p>
+          <a:p>
+            <a:r>
               <a:rPr lang="en-US" dirty="0" smtClean="0"/>
-              <a:t>Model-</a:t>
-            </a:r>
+              <a:t>Current MDD projects and interaction with the industry</a:t>
+            </a:r>
+          </a:p>
+          <a:p>
             <a:r>
               <a:rPr lang="en-US" dirty="0" smtClean="0"/>
-              <a:t>d</a:t>
-            </a:r>
-            <a:r>
-              <a:rPr lang="en-US" dirty="0" smtClean="0"/>
-              <a:t>riven technologies are in demand in industry due to the growing complexity of software development</a:t>
-            </a:r>
-          </a:p>
-          <a:p>
-            <a:r>
-              <a:rPr lang="en-US" dirty="0" smtClean="0"/>
-              <a:t>Good abstractions allow correctness-by-construction and verification</a:t>
-            </a:r>
-          </a:p>
-          <a:p>
-            <a:r>
-              <a:rPr lang="en-US" dirty="0" smtClean="0"/>
-              <a:t>The theory is mature enough, but the tools are not</a:t>
-            </a:r>
-          </a:p>
-          <a:p>
-            <a:r>
-              <a:rPr lang="en-US" dirty="0" smtClean="0"/>
-              <a:t>Add to that the difficulties of adoption</a:t>
-            </a:r>
-          </a:p>
-          <a:p>
-            <a:r>
-              <a:rPr lang="en-US" dirty="0" smtClean="0"/>
-              <a:t>One way to move forward are focused industrial projects</a:t>
-            </a:r>
-          </a:p>
-          <a:p>
-            <a:r>
-              <a:rPr lang="en-US" dirty="0" smtClean="0"/>
-              <a:t>and…</a:t>
-            </a:r>
-          </a:p>
-          <a:p>
-            <a:pPr lvl="1"/>
+              <a:t>Conclusion and Wrap-up</a:t>
+            </a:r>
             <a:endParaRPr lang="en-US" dirty="0"/>
           </a:p>
         </p:txBody>
@@ -8657,7 +9563,150 @@
             <a:fld id="{6E2D2B3B-882E-40F3-A32F-6DD516915044}" type="slidenum">
               <a:rPr lang="en-US" smtClean="0"/>
               <a:pPr/>
-              <a:t>25</a:t>
+              <a:t>3</a:t>
+            </a:fld>
+            <a:endParaRPr lang="en-US"/>
+          </a:p>
+        </p:txBody>
+      </p:sp>
+    </p:spTree>
+  </p:cSld>
+  <p:clrMapOvr>
+    <a:masterClrMapping/>
+  </p:clrMapOvr>
+  <p:timing>
+    <p:tnLst>
+      <p:par>
+        <p:cTn id="1" dur="indefinite" restart="never" nodeType="tmRoot"/>
+      </p:par>
+    </p:tnLst>
+  </p:timing>
+</p:sld>
+</file>
+
+<file path=ppt/slides/slide30.xml><?xml version="1.0" encoding="utf-8"?>
+<p:sld xmlns:a="http://schemas.openxmlformats.org/drawingml/2006/main" xmlns:r="http://schemas.openxmlformats.org/officeDocument/2006/relationships" xmlns:mc="http://schemas.openxmlformats.org/markup-compatibility/2006" xmlns:mv="urn:schemas-microsoft-com:mac:vml" xmlns:p="http://schemas.openxmlformats.org/presentationml/2006/main" mc:Ignorable="mv" mc:PreserveAttributes="mv:*">
+  <p:cSld>
+    <p:spTree>
+      <p:nvGrpSpPr>
+        <p:cNvPr id="1" name=""/>
+        <p:cNvGrpSpPr/>
+        <p:nvPr/>
+      </p:nvGrpSpPr>
+      <p:grpSpPr>
+        <a:xfrm>
+          <a:off x="0" y="0"/>
+          <a:ext cx="0" cy="0"/>
+          <a:chOff x="0" y="0"/>
+          <a:chExt cx="0" cy="0"/>
+        </a:xfrm>
+      </p:grpSpPr>
+      <p:sp>
+        <p:nvSpPr>
+          <p:cNvPr id="2" name="Title 1"/>
+          <p:cNvSpPr>
+            <a:spLocks noGrp="1"/>
+          </p:cNvSpPr>
+          <p:nvPr>
+            <p:ph type="title"/>
+          </p:nvPr>
+        </p:nvSpPr>
+        <p:spPr/>
+        <p:txBody>
+          <a:bodyPr/>
+          <a:lstStyle/>
+          <a:p>
+            <a:r>
+              <a:rPr lang="en-US" dirty="0" smtClean="0"/>
+              <a:t>Conclusion</a:t>
+            </a:r>
+            <a:endParaRPr lang="en-US" dirty="0"/>
+          </a:p>
+        </p:txBody>
+      </p:sp>
+      <p:sp>
+        <p:nvSpPr>
+          <p:cNvPr id="3" name="Content Placeholder 2"/>
+          <p:cNvSpPr>
+            <a:spLocks noGrp="1"/>
+          </p:cNvSpPr>
+          <p:nvPr>
+            <p:ph idx="1"/>
+          </p:nvPr>
+        </p:nvSpPr>
+        <p:spPr/>
+        <p:txBody>
+          <a:bodyPr/>
+          <a:lstStyle/>
+          <a:p>
+            <a:r>
+              <a:rPr lang="en-US" dirty="0" smtClean="0"/>
+              <a:t>Model transformation verification ( and Model</a:t>
+            </a:r>
+            <a:r>
+              <a:rPr lang="en-US" dirty="0" smtClean="0"/>
+              <a:t>-Driven </a:t>
+            </a:r>
+            <a:r>
+              <a:rPr lang="en-US" dirty="0" smtClean="0"/>
+              <a:t>technologies in general) are in demand in industry</a:t>
+            </a:r>
+          </a:p>
+          <a:p>
+            <a:r>
+              <a:rPr lang="en-US" dirty="0" smtClean="0"/>
+              <a:t>Good abstractions allow correctness-by-construction and verification</a:t>
+            </a:r>
+          </a:p>
+          <a:p>
+            <a:r>
+              <a:rPr lang="en-US" dirty="0" smtClean="0"/>
+              <a:t>The theory is mature enough, but the tools are not</a:t>
+            </a:r>
+          </a:p>
+          <a:p>
+            <a:r>
+              <a:rPr lang="en-US" dirty="0" smtClean="0"/>
+              <a:t>Add to that the difficulties of adoption</a:t>
+            </a:r>
+          </a:p>
+          <a:p>
+            <a:r>
+              <a:rPr lang="en-US" dirty="0" smtClean="0"/>
+              <a:t>One way to move forward are focused industrial projects</a:t>
+            </a:r>
+          </a:p>
+          <a:p>
+            <a:r>
+              <a:rPr lang="en-US" dirty="0" smtClean="0"/>
+              <a:t>and…</a:t>
+            </a:r>
+          </a:p>
+          <a:p>
+            <a:pPr lvl="1"/>
+            <a:endParaRPr lang="en-US" dirty="0"/>
+          </a:p>
+        </p:txBody>
+      </p:sp>
+      <p:sp>
+        <p:nvSpPr>
+          <p:cNvPr id="4" name="Slide Number Placeholder 3"/>
+          <p:cNvSpPr>
+            <a:spLocks noGrp="1"/>
+          </p:cNvSpPr>
+          <p:nvPr>
+            <p:ph type="sldNum" sz="quarter" idx="12"/>
+          </p:nvPr>
+        </p:nvSpPr>
+        <p:spPr/>
+        <p:txBody>
+          <a:bodyPr/>
+          <a:lstStyle/>
+          <a:p>
+            <a:fld id="{6E2D2B3B-882E-40F3-A32F-6DD516915044}" type="slidenum">
+              <a:rPr lang="en-US" smtClean="0"/>
+              <a:pPr/>
+              <a:t>30</a:t>
             </a:fld>
             <a:endParaRPr lang="en-US"/>
           </a:p>
@@ -8998,7 +10047,7 @@
 </p:sld>
 </file>
 
-<file path=ppt/slides/slide26.xml><?xml version="1.0" encoding="utf-8"?>
+<file path=ppt/slides/slide31.xml><?xml version="1.0" encoding="utf-8"?>
 <p:sld xmlns:a="http://schemas.openxmlformats.org/drawingml/2006/main" xmlns:r="http://schemas.openxmlformats.org/officeDocument/2006/relationships" xmlns:mc="http://schemas.openxmlformats.org/markup-compatibility/2006" xmlns:mv="urn:schemas-microsoft-com:mac:vml" xmlns:p="http://schemas.openxmlformats.org/presentationml/2006/main" mc:Ignorable="mv" mc:PreserveAttributes="mv:*">
   <p:cSld>
     <p:spTree>
@@ -9033,7 +10082,7 @@
             <a:fld id="{6E2D2B3B-882E-40F3-A32F-6DD516915044}" type="slidenum">
               <a:rPr lang="en-US" smtClean="0"/>
               <a:pPr/>
-              <a:t>26</a:t>
+              <a:t>31</a:t>
             </a:fld>
             <a:endParaRPr lang="en-US"/>
           </a:p>
@@ -9115,7 +10164,7 @@
         </p:nvSpPr>
         <p:spPr>
           <a:xfrm>
-            <a:off x="3011378" y="4654968"/>
+            <a:off x="2883458" y="4654968"/>
             <a:ext cx="3028594" cy="461665"/>
           </a:xfrm>
           <a:prstGeom prst="rect">
@@ -9131,11 +10180,7 @@
           <a:p>
             <a:r>
               <a:rPr lang="en-US" sz="2400" dirty="0" err="1" smtClean="0"/>
-              <a:t>l</a:t>
-            </a:r>
-            <a:r>
-              <a:rPr lang="en-US" sz="2400" dirty="0" err="1" smtClean="0"/>
-              <a:t>evi.lucio@fortiss.org</a:t>
+              <a:t>levi.lucio@fortiss.org</a:t>
             </a:r>
             <a:endParaRPr lang="en-US" sz="2400" dirty="0"/>
           </a:p>
@@ -9156,7 +10201,7 @@
 </p:sld>
 </file>
 
-<file path=ppt/slides/slide3.xml><?xml version="1.0" encoding="utf-8"?>
+<file path=ppt/slides/slide32.xml><?xml version="1.0" encoding="utf-8"?>
 <p:sld xmlns:a="http://schemas.openxmlformats.org/drawingml/2006/main" xmlns:r="http://schemas.openxmlformats.org/officeDocument/2006/relationships" xmlns:mc="http://schemas.openxmlformats.org/markup-compatibility/2006" xmlns:mv="urn:schemas-microsoft-com:mac:vml" xmlns:p="http://schemas.openxmlformats.org/presentationml/2006/main" mc:Ignorable="mv" mc:PreserveAttributes="mv:*">
   <p:cSld>
     <p:spTree>
@@ -9175,6 +10220,626 @@
       </p:grpSpPr>
       <p:sp>
         <p:nvSpPr>
+          <p:cNvPr id="2" name="Title 1"/>
+          <p:cNvSpPr>
+            <a:spLocks noGrp="1"/>
+          </p:cNvSpPr>
+          <p:nvPr>
+            <p:ph type="title"/>
+          </p:nvPr>
+        </p:nvSpPr>
+        <p:spPr/>
+        <p:txBody>
+          <a:bodyPr>
+            <a:normAutofit fontScale="90000"/>
+          </a:bodyPr>
+          <a:lstStyle/>
+          <a:p>
+            <a:r>
+              <a:rPr lang="en-US" dirty="0" smtClean="0"/>
+              <a:t>Model-Driven Development: Challenges</a:t>
+            </a:r>
+            <a:endParaRPr lang="en-US" dirty="0"/>
+          </a:p>
+        </p:txBody>
+      </p:sp>
+      <p:sp>
+        <p:nvSpPr>
+          <p:cNvPr id="3" name="Content Placeholder 2"/>
+          <p:cNvSpPr>
+            <a:spLocks noGrp="1"/>
+          </p:cNvSpPr>
+          <p:nvPr>
+            <p:ph idx="1"/>
+          </p:nvPr>
+        </p:nvSpPr>
+        <p:spPr>
+          <a:xfrm>
+            <a:off x="468745" y="1551355"/>
+            <a:ext cx="8229600" cy="4876800"/>
+          </a:xfrm>
+        </p:spPr>
+        <p:txBody>
+          <a:bodyPr/>
+          <a:lstStyle/>
+          <a:p>
+            <a:endParaRPr lang="en-US" dirty="0" smtClean="0"/>
+          </a:p>
+          <a:p>
+            <a:endParaRPr lang="en-US" dirty="0" smtClean="0"/>
+          </a:p>
+          <a:p>
+            <a:endParaRPr lang="en-US" dirty="0" smtClean="0"/>
+          </a:p>
+        </p:txBody>
+      </p:sp>
+      <p:sp>
+        <p:nvSpPr>
+          <p:cNvPr id="4" name="Slide Number Placeholder 3"/>
+          <p:cNvSpPr>
+            <a:spLocks noGrp="1"/>
+          </p:cNvSpPr>
+          <p:nvPr>
+            <p:ph type="sldNum" sz="quarter" idx="12"/>
+          </p:nvPr>
+        </p:nvSpPr>
+        <p:spPr/>
+        <p:txBody>
+          <a:bodyPr/>
+          <a:lstStyle/>
+          <a:p>
+            <a:fld id="{6E2D2B3B-882E-40F3-A32F-6DD516915044}" type="slidenum">
+              <a:rPr lang="en-US" smtClean="0"/>
+              <a:pPr/>
+              <a:t>32</a:t>
+            </a:fld>
+            <a:endParaRPr lang="en-US"/>
+          </a:p>
+        </p:txBody>
+      </p:sp>
+      <p:graphicFrame>
+        <p:nvGraphicFramePr>
+          <p:cNvPr id="6" name="Table 5"/>
+          <p:cNvGraphicFramePr>
+            <a:graphicFrameLocks noGrp="1"/>
+          </p:cNvGraphicFramePr>
+          <p:nvPr/>
+        </p:nvGraphicFramePr>
+        <p:xfrm>
+          <a:off x="2579238" y="2193632"/>
+          <a:ext cx="3734005" cy="3065376"/>
+        </p:xfrm>
+        <a:graphic>
+          <a:graphicData uri="http://schemas.openxmlformats.org/drawingml/2006/table">
+            <a:tbl>
+              <a:tblPr firstRow="1" bandRow="1">
+                <a:tableStyleId>{5C22544A-7EE6-4342-B048-85BDC9FD1C3A}</a:tableStyleId>
+              </a:tblPr>
+              <a:tblGrid>
+                <a:gridCol w="3734005"/>
+              </a:tblGrid>
+              <a:tr h="358546">
+                <a:tc>
+                  <a:txBody>
+                    <a:bodyPr/>
+                    <a:lstStyle/>
+                    <a:p>
+                      <a:r>
+                        <a:rPr lang="en-US" dirty="0" smtClean="0"/>
+                        <a:t>Challenges</a:t>
+                      </a:r>
+                      <a:endParaRPr lang="en-US" dirty="0"/>
+                    </a:p>
+                  </a:txBody>
+                  <a:tcPr/>
+                </a:tc>
+              </a:tr>
+              <a:tr h="2699616">
+                <a:tc>
+                  <a:txBody>
+                    <a:bodyPr/>
+                    <a:lstStyle/>
+                    <a:p>
+                      <a:pPr>
+                        <a:buFont typeface="Arial"/>
+                        <a:buChar char="•"/>
+                      </a:pPr>
+                      <a:r>
+                        <a:rPr lang="en-US" dirty="0" smtClean="0"/>
+                        <a:t> Insufficient higher</a:t>
+                      </a:r>
+                      <a:r>
+                        <a:rPr lang="en-US" baseline="0" dirty="0" smtClean="0"/>
+                        <a:t>-order model transformation technology</a:t>
+                      </a:r>
+                    </a:p>
+                    <a:p>
+                      <a:pPr>
+                        <a:buFont typeface="Arial"/>
+                        <a:buChar char="•"/>
+                      </a:pPr>
+                      <a:endParaRPr lang="en-US" sz="1000" baseline="0" dirty="0" smtClean="0"/>
+                    </a:p>
+                    <a:p>
+                      <a:pPr>
+                        <a:buFont typeface="Arial"/>
+                        <a:buChar char="•"/>
+                      </a:pPr>
+                      <a:r>
+                        <a:rPr lang="en-US" baseline="0" dirty="0" smtClean="0"/>
+                        <a:t> (AToM3) models are not built for memory-intensive applications</a:t>
+                      </a:r>
+                    </a:p>
+                    <a:p>
+                      <a:pPr>
+                        <a:buFont typeface="Arial"/>
+                        <a:buNone/>
+                      </a:pPr>
+                      <a:endParaRPr lang="en-US" sz="1000" baseline="0" dirty="0" smtClean="0"/>
+                    </a:p>
+                    <a:p>
+                      <a:pPr>
+                        <a:buFont typeface="Arial"/>
+                        <a:buChar char="•"/>
+                      </a:pPr>
+                      <a:r>
+                        <a:rPr lang="en-US" baseline="0" dirty="0" smtClean="0"/>
+                        <a:t> Transformations and code have to be developed together in an interleaved fashion</a:t>
+                      </a:r>
+                    </a:p>
+                  </a:txBody>
+                  <a:tcPr/>
+                </a:tc>
+              </a:tr>
+            </a:tbl>
+          </a:graphicData>
+        </a:graphic>
+      </p:graphicFrame>
+    </p:spTree>
+  </p:cSld>
+  <p:clrMapOvr>
+    <a:masterClrMapping/>
+  </p:clrMapOvr>
+  <p:timing>
+    <p:tnLst>
+      <p:par>
+        <p:cTn id="1" dur="indefinite" restart="never" nodeType="tmRoot"/>
+      </p:par>
+    </p:tnLst>
+  </p:timing>
+</p:sld>
+</file>
+
+<file path=ppt/slides/slide33.xml><?xml version="1.0" encoding="utf-8"?>
+<p:sld xmlns:a="http://schemas.openxmlformats.org/drawingml/2006/main" xmlns:r="http://schemas.openxmlformats.org/officeDocument/2006/relationships" xmlns:mc="http://schemas.openxmlformats.org/markup-compatibility/2006" xmlns:mv="urn:schemas-microsoft-com:mac:vml" xmlns:p="http://schemas.openxmlformats.org/presentationml/2006/main" mc:Ignorable="mv" mc:PreserveAttributes="mv:*">
+  <p:cSld>
+    <p:spTree>
+      <p:nvGrpSpPr>
+        <p:cNvPr id="1" name=""/>
+        <p:cNvGrpSpPr/>
+        <p:nvPr/>
+      </p:nvGrpSpPr>
+      <p:grpSpPr>
+        <a:xfrm>
+          <a:off x="0" y="0"/>
+          <a:ext cx="0" cy="0"/>
+          <a:chOff x="0" y="0"/>
+          <a:chExt cx="0" cy="0"/>
+        </a:xfrm>
+      </p:grpSpPr>
+      <p:sp>
+        <p:nvSpPr>
+          <p:cNvPr id="2" name="Title 1"/>
+          <p:cNvSpPr>
+            <a:spLocks noGrp="1"/>
+          </p:cNvSpPr>
+          <p:nvPr>
+            <p:ph type="title"/>
+          </p:nvPr>
+        </p:nvSpPr>
+        <p:spPr/>
+        <p:txBody>
+          <a:bodyPr>
+            <a:normAutofit fontScale="90000"/>
+          </a:bodyPr>
+          <a:lstStyle/>
+          <a:p>
+            <a:r>
+              <a:rPr lang="en-US" dirty="0" smtClean="0"/>
+              <a:t>Model-Driven Development: Advantages</a:t>
+            </a:r>
+            <a:endParaRPr lang="en-US" dirty="0"/>
+          </a:p>
+        </p:txBody>
+      </p:sp>
+      <p:sp>
+        <p:nvSpPr>
+          <p:cNvPr id="3" name="Content Placeholder 2"/>
+          <p:cNvSpPr>
+            <a:spLocks noGrp="1"/>
+          </p:cNvSpPr>
+          <p:nvPr>
+            <p:ph idx="1"/>
+          </p:nvPr>
+        </p:nvSpPr>
+        <p:spPr>
+          <a:xfrm>
+            <a:off x="468745" y="1551355"/>
+            <a:ext cx="8229600" cy="4876800"/>
+          </a:xfrm>
+        </p:spPr>
+        <p:txBody>
+          <a:bodyPr/>
+          <a:lstStyle/>
+          <a:p>
+            <a:endParaRPr lang="en-US" dirty="0" smtClean="0"/>
+          </a:p>
+          <a:p>
+            <a:endParaRPr lang="en-US" dirty="0" smtClean="0"/>
+          </a:p>
+          <a:p>
+            <a:endParaRPr lang="en-US" dirty="0" smtClean="0"/>
+          </a:p>
+        </p:txBody>
+      </p:sp>
+      <p:sp>
+        <p:nvSpPr>
+          <p:cNvPr id="4" name="Slide Number Placeholder 3"/>
+          <p:cNvSpPr>
+            <a:spLocks noGrp="1"/>
+          </p:cNvSpPr>
+          <p:nvPr>
+            <p:ph type="sldNum" sz="quarter" idx="12"/>
+          </p:nvPr>
+        </p:nvSpPr>
+        <p:spPr/>
+        <p:txBody>
+          <a:bodyPr/>
+          <a:lstStyle/>
+          <a:p>
+            <a:fld id="{6E2D2B3B-882E-40F3-A32F-6DD516915044}" type="slidenum">
+              <a:rPr lang="en-US" smtClean="0"/>
+              <a:pPr/>
+              <a:t>33</a:t>
+            </a:fld>
+            <a:endParaRPr lang="en-US"/>
+          </a:p>
+        </p:txBody>
+      </p:sp>
+      <p:graphicFrame>
+        <p:nvGraphicFramePr>
+          <p:cNvPr id="6" name="Table 5"/>
+          <p:cNvGraphicFramePr>
+            <a:graphicFrameLocks noGrp="1"/>
+          </p:cNvGraphicFramePr>
+          <p:nvPr/>
+        </p:nvGraphicFramePr>
+        <p:xfrm>
+          <a:off x="2556148" y="2187486"/>
+          <a:ext cx="3734005" cy="2280605"/>
+        </p:xfrm>
+        <a:graphic>
+          <a:graphicData uri="http://schemas.openxmlformats.org/drawingml/2006/table">
+            <a:tbl>
+              <a:tblPr firstRow="1" bandRow="1">
+                <a:tableStyleId>{5C22544A-7EE6-4342-B048-85BDC9FD1C3A}</a:tableStyleId>
+              </a:tblPr>
+              <a:tblGrid>
+                <a:gridCol w="3734005"/>
+              </a:tblGrid>
+              <a:tr h="254317">
+                <a:tc>
+                  <a:txBody>
+                    <a:bodyPr/>
+                    <a:lstStyle/>
+                    <a:p>
+                      <a:r>
+                        <a:rPr lang="en-US" dirty="0" smtClean="0"/>
+                        <a:t>Advantages</a:t>
+                      </a:r>
+                      <a:endParaRPr lang="en-US" dirty="0"/>
+                    </a:p>
+                  </a:txBody>
+                  <a:tcPr/>
+                </a:tc>
+              </a:tr>
+              <a:tr h="1914845">
+                <a:tc>
+                  <a:txBody>
+                    <a:bodyPr/>
+                    <a:lstStyle/>
+                    <a:p>
+                      <a:pPr>
+                        <a:buFont typeface="Arial"/>
+                        <a:buChar char="•"/>
+                      </a:pPr>
+                      <a:r>
+                        <a:rPr lang="en-US" baseline="0" dirty="0" smtClean="0"/>
+                        <a:t> (Surprisingly) speed!</a:t>
+                      </a:r>
+                    </a:p>
+                    <a:p>
+                      <a:pPr>
+                        <a:buFont typeface="Arial"/>
+                        <a:buChar char="•"/>
+                      </a:pPr>
+                      <a:endParaRPr lang="en-US" sz="1000" baseline="0" dirty="0" smtClean="0"/>
+                    </a:p>
+                    <a:p>
+                      <a:pPr>
+                        <a:buFont typeface="Arial"/>
+                        <a:buChar char="•"/>
+                      </a:pPr>
+                      <a:r>
+                        <a:rPr lang="en-US" dirty="0" smtClean="0"/>
+                        <a:t> Adapted to the domain</a:t>
+                      </a:r>
+                      <a:endParaRPr lang="en-US" baseline="0" dirty="0" smtClean="0"/>
+                    </a:p>
+                    <a:p>
+                      <a:pPr>
+                        <a:buFont typeface="Arial"/>
+                        <a:buNone/>
+                      </a:pPr>
+                      <a:endParaRPr lang="en-US" sz="1000" baseline="0" dirty="0" smtClean="0"/>
+                    </a:p>
+                    <a:p>
+                      <a:pPr>
+                        <a:buFont typeface="Arial"/>
+                        <a:buChar char="•"/>
+                      </a:pPr>
+                      <a:r>
+                        <a:rPr lang="en-US" baseline="0" dirty="0" smtClean="0"/>
+                        <a:t> Models simplify the usage of complex data types</a:t>
+                      </a:r>
+                    </a:p>
+                  </a:txBody>
+                  <a:tcPr/>
+                </a:tc>
+              </a:tr>
+            </a:tbl>
+          </a:graphicData>
+        </a:graphic>
+      </p:graphicFrame>
+    </p:spTree>
+  </p:cSld>
+  <p:clrMapOvr>
+    <a:masterClrMapping/>
+  </p:clrMapOvr>
+  <p:timing>
+    <p:tnLst>
+      <p:par>
+        <p:cTn id="1" dur="indefinite" restart="never" nodeType="tmRoot"/>
+      </p:par>
+    </p:tnLst>
+  </p:timing>
+</p:sld>
+</file>
+
+<file path=ppt/slides/slide34.xml><?xml version="1.0" encoding="utf-8"?>
+<p:sld xmlns:a="http://schemas.openxmlformats.org/drawingml/2006/main" xmlns:r="http://schemas.openxmlformats.org/officeDocument/2006/relationships" xmlns:mc="http://schemas.openxmlformats.org/markup-compatibility/2006" xmlns:mv="urn:schemas-microsoft-com:mac:vml" xmlns:p="http://schemas.openxmlformats.org/presentationml/2006/main" mc:Ignorable="mv" mc:PreserveAttributes="mv:*">
+  <p:cSld>
+    <p:spTree>
+      <p:nvGrpSpPr>
+        <p:cNvPr id="1" name=""/>
+        <p:cNvGrpSpPr/>
+        <p:nvPr/>
+      </p:nvGrpSpPr>
+      <p:grpSpPr>
+        <a:xfrm>
+          <a:off x="0" y="0"/>
+          <a:ext cx="0" cy="0"/>
+          <a:chOff x="0" y="0"/>
+          <a:chExt cx="0" cy="0"/>
+        </a:xfrm>
+      </p:grpSpPr>
+      <p:sp>
+        <p:nvSpPr>
+          <p:cNvPr id="2" name="Title 1"/>
+          <p:cNvSpPr>
+            <a:spLocks noGrp="1"/>
+          </p:cNvSpPr>
+          <p:nvPr>
+            <p:ph type="title"/>
+          </p:nvPr>
+        </p:nvSpPr>
+        <p:spPr/>
+        <p:txBody>
+          <a:bodyPr>
+            <a:normAutofit fontScale="90000"/>
+          </a:bodyPr>
+          <a:lstStyle/>
+          <a:p>
+            <a:r>
+              <a:rPr lang="en-US" dirty="0" smtClean="0"/>
+              <a:t>Model-Driven Development: Ambivalent</a:t>
+            </a:r>
+            <a:endParaRPr lang="en-US" dirty="0"/>
+          </a:p>
+        </p:txBody>
+      </p:sp>
+      <p:sp>
+        <p:nvSpPr>
+          <p:cNvPr id="3" name="Content Placeholder 2"/>
+          <p:cNvSpPr>
+            <a:spLocks noGrp="1"/>
+          </p:cNvSpPr>
+          <p:nvPr>
+            <p:ph idx="1"/>
+          </p:nvPr>
+        </p:nvSpPr>
+        <p:spPr>
+          <a:xfrm>
+            <a:off x="468745" y="1551355"/>
+            <a:ext cx="8229600" cy="4876800"/>
+          </a:xfrm>
+        </p:spPr>
+        <p:txBody>
+          <a:bodyPr/>
+          <a:lstStyle/>
+          <a:p>
+            <a:endParaRPr lang="en-US" dirty="0" smtClean="0"/>
+          </a:p>
+          <a:p>
+            <a:endParaRPr lang="en-US" dirty="0" smtClean="0"/>
+          </a:p>
+          <a:p>
+            <a:endParaRPr lang="en-US" dirty="0" smtClean="0"/>
+          </a:p>
+        </p:txBody>
+      </p:sp>
+      <p:sp>
+        <p:nvSpPr>
+          <p:cNvPr id="4" name="Slide Number Placeholder 3"/>
+          <p:cNvSpPr>
+            <a:spLocks noGrp="1"/>
+          </p:cNvSpPr>
+          <p:nvPr>
+            <p:ph type="sldNum" sz="quarter" idx="12"/>
+          </p:nvPr>
+        </p:nvSpPr>
+        <p:spPr/>
+        <p:txBody>
+          <a:bodyPr/>
+          <a:lstStyle/>
+          <a:p>
+            <a:fld id="{6E2D2B3B-882E-40F3-A32F-6DD516915044}" type="slidenum">
+              <a:rPr lang="en-US" smtClean="0"/>
+              <a:pPr/>
+              <a:t>34</a:t>
+            </a:fld>
+            <a:endParaRPr lang="en-US"/>
+          </a:p>
+        </p:txBody>
+      </p:sp>
+      <p:graphicFrame>
+        <p:nvGraphicFramePr>
+          <p:cNvPr id="6" name="Table 5"/>
+          <p:cNvGraphicFramePr>
+            <a:graphicFrameLocks noGrp="1"/>
+          </p:cNvGraphicFramePr>
+          <p:nvPr/>
+        </p:nvGraphicFramePr>
+        <p:xfrm>
+          <a:off x="2567693" y="2193636"/>
+          <a:ext cx="3734005" cy="2565976"/>
+        </p:xfrm>
+        <a:graphic>
+          <a:graphicData uri="http://schemas.openxmlformats.org/drawingml/2006/table">
+            <a:tbl>
+              <a:tblPr firstRow="1" bandRow="1">
+                <a:tableStyleId>{5C22544A-7EE6-4342-B048-85BDC9FD1C3A}</a:tableStyleId>
+              </a:tblPr>
+              <a:tblGrid>
+                <a:gridCol w="3734005"/>
+              </a:tblGrid>
+              <a:tr h="292219">
+                <a:tc>
+                  <a:txBody>
+                    <a:bodyPr/>
+                    <a:lstStyle/>
+                    <a:p>
+                      <a:r>
+                        <a:rPr lang="en-US" dirty="0" smtClean="0"/>
+                        <a:t>Ambivalent</a:t>
+                      </a:r>
+                      <a:endParaRPr lang="en-US" dirty="0"/>
+                    </a:p>
+                  </a:txBody>
+                  <a:tcPr/>
+                </a:tc>
+              </a:tr>
+              <a:tr h="2200216">
+                <a:tc>
+                  <a:txBody>
+                    <a:bodyPr/>
+                    <a:lstStyle/>
+                    <a:p>
+                      <a:pPr>
+                        <a:buFont typeface="Arial"/>
+                        <a:buChar char="•"/>
+                      </a:pPr>
+                      <a:r>
+                        <a:rPr lang="en-US" baseline="0" dirty="0" smtClean="0"/>
+                        <a:t> Right level of abstraction through the usage of </a:t>
+                      </a:r>
+                      <a:r>
+                        <a:rPr lang="en-US" baseline="0" dirty="0" err="1" smtClean="0"/>
+                        <a:t>metamodels</a:t>
+                      </a:r>
+                      <a:r>
+                        <a:rPr lang="en-US" baseline="0" dirty="0" smtClean="0"/>
+                        <a:t> and model transformations</a:t>
+                      </a:r>
+                    </a:p>
+                    <a:p>
+                      <a:pPr>
+                        <a:buFont typeface="Arial"/>
+                        <a:buNone/>
+                      </a:pPr>
+                      <a:endParaRPr lang="en-US" sz="1000" baseline="0" dirty="0" smtClean="0"/>
+                    </a:p>
+                    <a:p>
+                      <a:pPr>
+                        <a:buFont typeface="Arial"/>
+                        <a:buChar char="•"/>
+                      </a:pPr>
+                      <a:r>
+                        <a:rPr lang="en-US" baseline="0" dirty="0" smtClean="0"/>
+                        <a:t> Visual edition and debugging of </a:t>
+                      </a:r>
+                      <a:r>
+                        <a:rPr lang="en-US" baseline="0" dirty="0" err="1" smtClean="0"/>
+                        <a:t>metamodels</a:t>
+                      </a:r>
+                      <a:r>
+                        <a:rPr lang="en-US" baseline="0" dirty="0" smtClean="0"/>
+                        <a:t>, models and model transformations</a:t>
+                      </a:r>
+                      <a:endParaRPr lang="en-US" dirty="0"/>
+                    </a:p>
+                  </a:txBody>
+                  <a:tcPr/>
+                </a:tc>
+              </a:tr>
+            </a:tbl>
+          </a:graphicData>
+        </a:graphic>
+      </p:graphicFrame>
+    </p:spTree>
+  </p:cSld>
+  <p:clrMapOvr>
+    <a:masterClrMapping/>
+  </p:clrMapOvr>
+  <p:timing>
+    <p:tnLst>
+      <p:par>
+        <p:cTn id="1" dur="indefinite" restart="never" nodeType="tmRoot"/>
+      </p:par>
+    </p:tnLst>
+  </p:timing>
+</p:sld>
+</file>
+
+<file path=ppt/slides/slide4.xml><?xml version="1.0" encoding="utf-8"?>
+<p:sld xmlns:a="http://schemas.openxmlformats.org/drawingml/2006/main" xmlns:r="http://schemas.openxmlformats.org/officeDocument/2006/relationships" xmlns:mc="http://schemas.openxmlformats.org/markup-compatibility/2006" xmlns:mv="urn:schemas-microsoft-com:mac:vml" xmlns:p="http://schemas.openxmlformats.org/presentationml/2006/main" mc:Ignorable="mv" mc:PreserveAttributes="mv:*">
+  <p:cSld>
+    <p:spTree>
+      <p:nvGrpSpPr>
+        <p:cNvPr id="1" name=""/>
+        <p:cNvGrpSpPr/>
+        <p:nvPr/>
+      </p:nvGrpSpPr>
+      <p:grpSpPr>
+        <a:xfrm>
+          <a:off x="0" y="0"/>
+          <a:ext cx="0" cy="0"/>
+          <a:chOff x="0" y="0"/>
+          <a:chExt cx="0" cy="0"/>
+        </a:xfrm>
+      </p:grpSpPr>
+      <p:sp>
+        <p:nvSpPr>
           <p:cNvPr id="3" name="Content Placeholder 2"/>
           <p:cNvSpPr>
             <a:spLocks noGrp="1"/>
@@ -9310,7 +10975,7 @@
             <a:fld id="{6E2D2B3B-882E-40F3-A32F-6DD516915044}" type="slidenum">
               <a:rPr lang="en-US" smtClean="0"/>
               <a:pPr/>
-              <a:t>3</a:t>
+              <a:t>4</a:t>
             </a:fld>
             <a:endParaRPr lang="en-US"/>
           </a:p>
@@ -9812,149 +11477,6 @@
 </p:sld>
 </file>
 
-<file path=ppt/slides/slide4.xml><?xml version="1.0" encoding="utf-8"?>
-<p:sld xmlns:a="http://schemas.openxmlformats.org/drawingml/2006/main" xmlns:r="http://schemas.openxmlformats.org/officeDocument/2006/relationships" xmlns:mc="http://schemas.openxmlformats.org/markup-compatibility/2006" xmlns:mv="urn:schemas-microsoft-com:mac:vml" xmlns:p="http://schemas.openxmlformats.org/presentationml/2006/main" mc:Ignorable="mv" mc:PreserveAttributes="mv:*">
-  <p:cSld>
-    <p:spTree>
-      <p:nvGrpSpPr>
-        <p:cNvPr id="1" name=""/>
-        <p:cNvGrpSpPr/>
-        <p:nvPr/>
-      </p:nvGrpSpPr>
-      <p:grpSpPr>
-        <a:xfrm>
-          <a:off x="0" y="0"/>
-          <a:ext cx="0" cy="0"/>
-          <a:chOff x="0" y="0"/>
-          <a:chExt cx="0" cy="0"/>
-        </a:xfrm>
-      </p:grpSpPr>
-      <p:sp>
-        <p:nvSpPr>
-          <p:cNvPr id="3" name="Slide Number Placeholder 2"/>
-          <p:cNvSpPr>
-            <a:spLocks noGrp="1"/>
-          </p:cNvSpPr>
-          <p:nvPr>
-            <p:ph type="sldNum" sz="quarter" idx="12"/>
-          </p:nvPr>
-        </p:nvSpPr>
-        <p:spPr/>
-        <p:txBody>
-          <a:bodyPr/>
-          <a:lstStyle/>
-          <a:p>
-            <a:fld id="{6E2D2B3B-882E-40F3-A32F-6DD516915044}" type="slidenum">
-              <a:rPr lang="en-US" smtClean="0"/>
-              <a:pPr/>
-              <a:t>4</a:t>
-            </a:fld>
-            <a:endParaRPr lang="en-US"/>
-          </a:p>
-        </p:txBody>
-      </p:sp>
-      <p:sp>
-        <p:nvSpPr>
-          <p:cNvPr id="5" name="TextBox 4"/>
-          <p:cNvSpPr txBox="1"/>
-          <p:nvPr/>
-        </p:nvSpPr>
-        <p:spPr>
-          <a:xfrm>
-            <a:off x="3106183" y="3766879"/>
-            <a:ext cx="2739652" cy="861774"/>
-          </a:xfrm>
-          <a:prstGeom prst="rect">
-            <a:avLst/>
-          </a:prstGeom>
-          <a:noFill/>
-        </p:spPr>
-        <p:txBody>
-          <a:bodyPr wrap="none" rtlCol="0">
-            <a:spAutoFit/>
-          </a:bodyPr>
-          <a:lstStyle/>
-          <a:p>
-            <a:pPr algn="ctr"/>
-            <a:r>
-              <a:rPr lang="en-US" dirty="0" smtClean="0"/>
-              <a:t/>
-            </a:r>
-            <a:br>
-              <a:rPr lang="en-US" dirty="0" smtClean="0"/>
-            </a:br>
-            <a:r>
-              <a:rPr lang="en-US" sz="3200" dirty="0" smtClean="0"/>
-              <a:t>and live demo</a:t>
-            </a:r>
-            <a:endParaRPr lang="en-US" sz="3200" dirty="0"/>
-          </a:p>
-        </p:txBody>
-      </p:sp>
-      <p:sp>
-        <p:nvSpPr>
-          <p:cNvPr id="4" name="TextBox 3"/>
-          <p:cNvSpPr txBox="1"/>
-          <p:nvPr/>
-        </p:nvSpPr>
-        <p:spPr>
-          <a:xfrm>
-            <a:off x="2155287" y="2192823"/>
-            <a:ext cx="4703756" cy="1292662"/>
-          </a:xfrm>
-          <a:prstGeom prst="rect">
-            <a:avLst/>
-          </a:prstGeom>
-          <a:noFill/>
-        </p:spPr>
-        <p:txBody>
-          <a:bodyPr wrap="none" rtlCol="0">
-            <a:spAutoFit/>
-          </a:bodyPr>
-          <a:lstStyle/>
-          <a:p>
-            <a:pPr algn="ctr"/>
-            <a:r>
-              <a:rPr lang="en-US" dirty="0" smtClean="0"/>
-              <a:t/>
-            </a:r>
-            <a:br>
-              <a:rPr lang="en-US" dirty="0" smtClean="0"/>
-            </a:br>
-            <a:r>
-              <a:rPr lang="en-US" sz="4000" dirty="0" smtClean="0">
-                <a:hlinkClick r:id="rId2"/>
-              </a:rPr>
-              <a:t>VIDEO</a:t>
-            </a:r>
-            <a:endParaRPr lang="en-US" sz="4000" dirty="0" smtClean="0"/>
-          </a:p>
-          <a:p>
-            <a:pPr algn="ctr"/>
-            <a:r>
-              <a:rPr lang="en-US" sz="2000" dirty="0" smtClean="0"/>
-              <a:t>(video editing by Bentley James Oakes)</a:t>
-            </a:r>
-            <a:endParaRPr lang="en-US" sz="2000" dirty="0"/>
-          </a:p>
-        </p:txBody>
-      </p:sp>
-    </p:spTree>
-  </p:cSld>
-  <p:clrMapOvr>
-    <a:masterClrMapping/>
-  </p:clrMapOvr>
-  <p:transition/>
-  <p:timing>
-    <p:tnLst>
-      <p:par>
-        <p:cTn id="1" dur="indefinite" restart="never" nodeType="tmRoot"/>
-      </p:par>
-    </p:tnLst>
-  </p:timing>
-</p:sld>
-</file>
-
 <file path=ppt/slides/slide5.xml><?xml version="1.0" encoding="utf-8"?>
 <p:sld xmlns:a="http://schemas.openxmlformats.org/drawingml/2006/main" xmlns:r="http://schemas.openxmlformats.org/officeDocument/2006/relationships" xmlns:mc="http://schemas.openxmlformats.org/markup-compatibility/2006" xmlns:mv="urn:schemas-microsoft-com:mac:vml" xmlns:p="http://schemas.openxmlformats.org/presentationml/2006/main" mc:Ignorable="mv" mc:PreserveAttributes="mv:*">
   <p:cSld>
@@ -9974,29 +11496,6 @@
       </p:grpSpPr>
       <p:sp>
         <p:nvSpPr>
-          <p:cNvPr id="2" name="Title 1"/>
-          <p:cNvSpPr>
-            <a:spLocks noGrp="1"/>
-          </p:cNvSpPr>
-          <p:nvPr>
-            <p:ph type="title"/>
-          </p:nvPr>
-        </p:nvSpPr>
-        <p:spPr/>
-        <p:txBody>
-          <a:bodyPr/>
-          <a:lstStyle/>
-          <a:p>
-            <a:r>
-              <a:rPr lang="en-US" dirty="0" smtClean="0"/>
-              <a:t>Implementation</a:t>
-            </a:r>
-            <a:endParaRPr lang="en-US" dirty="0"/>
-          </a:p>
-        </p:txBody>
-      </p:sp>
-      <p:sp>
-        <p:nvSpPr>
           <p:cNvPr id="3" name="Slide Number Placeholder 2"/>
           <p:cNvSpPr>
             <a:spLocks noGrp="1"/>
@@ -10021,14 +11520,14 @@
       </p:sp>
       <p:sp>
         <p:nvSpPr>
-          <p:cNvPr id="4" name="TextBox 3"/>
+          <p:cNvPr id="5" name="TextBox 4"/>
           <p:cNvSpPr txBox="1"/>
           <p:nvPr/>
         </p:nvSpPr>
         <p:spPr>
           <a:xfrm>
-            <a:off x="380360" y="1881946"/>
-            <a:ext cx="8316437" cy="923330"/>
+            <a:off x="3106183" y="3766879"/>
+            <a:ext cx="2739652" cy="861774"/>
           </a:xfrm>
           <a:prstGeom prst="rect">
             <a:avLst/>
@@ -10043,34 +11542,30 @@
           <a:p>
             <a:pPr algn="ctr"/>
             <a:r>
-              <a:rPr lang="en-US" u="sng" dirty="0" smtClean="0"/>
-              <a:t>Principle: </a:t>
-            </a:r>
-          </a:p>
-          <a:p>
-            <a:pPr algn="ctr"/>
-            <a:endParaRPr lang="en-US" u="sng" dirty="0" smtClean="0"/>
-          </a:p>
-          <a:p>
-            <a:pPr algn="ctr"/>
-            <a:r>
-              <a:rPr lang="en-US" b="1" dirty="0" smtClean="0"/>
-              <a:t>Development of the tool should be model-driven (as much as as possible) </a:t>
-            </a:r>
-            <a:endParaRPr lang="en-US" b="1" dirty="0"/>
-          </a:p>
-        </p:txBody>
-      </p:sp>
-      <p:sp>
-        <p:nvSpPr>
-          <p:cNvPr id="6" name="TextBox 5"/>
+              <a:rPr lang="en-US" dirty="0" smtClean="0"/>
+              <a:t/>
+            </a:r>
+            <a:br>
+              <a:rPr lang="en-US" dirty="0" smtClean="0"/>
+            </a:br>
+            <a:r>
+              <a:rPr lang="en-US" sz="3200" dirty="0" smtClean="0"/>
+              <a:t>and live demo</a:t>
+            </a:r>
+            <a:endParaRPr lang="en-US" sz="3200" dirty="0"/>
+          </a:p>
+        </p:txBody>
+      </p:sp>
+      <p:sp>
+        <p:nvSpPr>
+          <p:cNvPr id="4" name="TextBox 3"/>
           <p:cNvSpPr txBox="1"/>
           <p:nvPr/>
         </p:nvSpPr>
         <p:spPr>
           <a:xfrm>
-            <a:off x="3081801" y="4463801"/>
-            <a:ext cx="4224233" cy="1477328"/>
+            <a:off x="2155287" y="2192823"/>
+            <a:ext cx="4703756" cy="1292662"/>
           </a:xfrm>
           <a:prstGeom prst="rect">
             <a:avLst/>
@@ -10083,6 +11578,176 @@
           </a:bodyPr>
           <a:lstStyle/>
           <a:p>
+            <a:pPr algn="ctr"/>
+            <a:r>
+              <a:rPr lang="en-US" dirty="0" smtClean="0"/>
+              <a:t/>
+            </a:r>
+            <a:br>
+              <a:rPr lang="en-US" dirty="0" smtClean="0"/>
+            </a:br>
+            <a:r>
+              <a:rPr lang="en-US" sz="4000" dirty="0" smtClean="0">
+                <a:hlinkClick r:id="rId2"/>
+              </a:rPr>
+              <a:t>VIDEO</a:t>
+            </a:r>
+            <a:endParaRPr lang="en-US" sz="4000" dirty="0" smtClean="0"/>
+          </a:p>
+          <a:p>
+            <a:pPr algn="ctr"/>
+            <a:r>
+              <a:rPr lang="en-US" sz="2000" dirty="0" smtClean="0"/>
+              <a:t>(video editing by Bentley James Oakes)</a:t>
+            </a:r>
+            <a:endParaRPr lang="en-US" sz="2000" dirty="0"/>
+          </a:p>
+        </p:txBody>
+      </p:sp>
+    </p:spTree>
+  </p:cSld>
+  <p:clrMapOvr>
+    <a:masterClrMapping/>
+  </p:clrMapOvr>
+  <p:transition/>
+  <p:timing>
+    <p:tnLst>
+      <p:par>
+        <p:cTn id="1" dur="indefinite" restart="never" nodeType="tmRoot"/>
+      </p:par>
+    </p:tnLst>
+  </p:timing>
+</p:sld>
+</file>
+
+<file path=ppt/slides/slide6.xml><?xml version="1.0" encoding="utf-8"?>
+<p:sld xmlns:a="http://schemas.openxmlformats.org/drawingml/2006/main" xmlns:r="http://schemas.openxmlformats.org/officeDocument/2006/relationships" xmlns:mc="http://schemas.openxmlformats.org/markup-compatibility/2006" xmlns:mv="urn:schemas-microsoft-com:mac:vml" xmlns:p="http://schemas.openxmlformats.org/presentationml/2006/main" mc:Ignorable="mv" mc:PreserveAttributes="mv:*">
+  <p:cSld>
+    <p:spTree>
+      <p:nvGrpSpPr>
+        <p:cNvPr id="1" name=""/>
+        <p:cNvGrpSpPr/>
+        <p:nvPr/>
+      </p:nvGrpSpPr>
+      <p:grpSpPr>
+        <a:xfrm>
+          <a:off x="0" y="0"/>
+          <a:ext cx="0" cy="0"/>
+          <a:chOff x="0" y="0"/>
+          <a:chExt cx="0" cy="0"/>
+        </a:xfrm>
+      </p:grpSpPr>
+      <p:sp>
+        <p:nvSpPr>
+          <p:cNvPr id="2" name="Title 1"/>
+          <p:cNvSpPr>
+            <a:spLocks noGrp="1"/>
+          </p:cNvSpPr>
+          <p:nvPr>
+            <p:ph type="title"/>
+          </p:nvPr>
+        </p:nvSpPr>
+        <p:spPr/>
+        <p:txBody>
+          <a:bodyPr/>
+          <a:lstStyle/>
+          <a:p>
+            <a:r>
+              <a:rPr lang="en-US" dirty="0" smtClean="0"/>
+              <a:t>Implementation</a:t>
+            </a:r>
+            <a:endParaRPr lang="en-US" dirty="0"/>
+          </a:p>
+        </p:txBody>
+      </p:sp>
+      <p:sp>
+        <p:nvSpPr>
+          <p:cNvPr id="3" name="Slide Number Placeholder 2"/>
+          <p:cNvSpPr>
+            <a:spLocks noGrp="1"/>
+          </p:cNvSpPr>
+          <p:nvPr>
+            <p:ph type="sldNum" sz="quarter" idx="12"/>
+          </p:nvPr>
+        </p:nvSpPr>
+        <p:spPr/>
+        <p:txBody>
+          <a:bodyPr/>
+          <a:lstStyle/>
+          <a:p>
+            <a:fld id="{6E2D2B3B-882E-40F3-A32F-6DD516915044}" type="slidenum">
+              <a:rPr lang="en-US" smtClean="0"/>
+              <a:pPr/>
+              <a:t>6</a:t>
+            </a:fld>
+            <a:endParaRPr lang="en-US"/>
+          </a:p>
+        </p:txBody>
+      </p:sp>
+      <p:sp>
+        <p:nvSpPr>
+          <p:cNvPr id="4" name="TextBox 3"/>
+          <p:cNvSpPr txBox="1"/>
+          <p:nvPr/>
+        </p:nvSpPr>
+        <p:spPr>
+          <a:xfrm>
+            <a:off x="380360" y="1881946"/>
+            <a:ext cx="8316437" cy="923330"/>
+          </a:xfrm>
+          <a:prstGeom prst="rect">
+            <a:avLst/>
+          </a:prstGeom>
+          <a:noFill/>
+        </p:spPr>
+        <p:txBody>
+          <a:bodyPr wrap="none" rtlCol="0">
+            <a:spAutoFit/>
+          </a:bodyPr>
+          <a:lstStyle/>
+          <a:p>
+            <a:pPr algn="ctr"/>
+            <a:r>
+              <a:rPr lang="en-US" u="sng" dirty="0" smtClean="0"/>
+              <a:t>Principle: </a:t>
+            </a:r>
+          </a:p>
+          <a:p>
+            <a:pPr algn="ctr"/>
+            <a:endParaRPr lang="en-US" u="sng" dirty="0" smtClean="0"/>
+          </a:p>
+          <a:p>
+            <a:pPr algn="ctr"/>
+            <a:r>
+              <a:rPr lang="en-US" b="1" dirty="0" smtClean="0"/>
+              <a:t>Development of the tool should be model-driven (as much as as possible) </a:t>
+            </a:r>
+            <a:endParaRPr lang="en-US" b="1" dirty="0"/>
+          </a:p>
+        </p:txBody>
+      </p:sp>
+      <p:sp>
+        <p:nvSpPr>
+          <p:cNvPr id="6" name="TextBox 5"/>
+          <p:cNvSpPr txBox="1"/>
+          <p:nvPr/>
+        </p:nvSpPr>
+        <p:spPr>
+          <a:xfrm>
+            <a:off x="3081801" y="4463801"/>
+            <a:ext cx="4224233" cy="1477328"/>
+          </a:xfrm>
+          <a:prstGeom prst="rect">
+            <a:avLst/>
+          </a:prstGeom>
+          <a:noFill/>
+        </p:spPr>
+        <p:txBody>
+          <a:bodyPr wrap="none" rtlCol="0">
+            <a:spAutoFit/>
+          </a:bodyPr>
+          <a:lstStyle/>
+          <a:p>
             <a:r>
               <a:rPr lang="en-US" dirty="0" smtClean="0"/>
               <a:t>    First class citizens:</a:t>
@@ -10163,11 +11828,7 @@
             </a:r>
             <a:r>
               <a:rPr lang="en-US" dirty="0" smtClean="0"/>
-              <a:t>) of abstraction using the most appropriate formalisms</a:t>
-            </a:r>
-            <a:r>
-              <a:rPr lang="en-US" dirty="0" smtClean="0"/>
-              <a:t>”</a:t>
+              <a:t>) of abstraction using the most appropriate formalisms”</a:t>
             </a:r>
           </a:p>
         </p:txBody>
@@ -10283,7 +11944,7 @@
 </p:sld>
 </file>
 
-<file path=ppt/slides/slide6.xml><?xml version="1.0" encoding="utf-8"?>
+<file path=ppt/slides/slide7.xml><?xml version="1.0" encoding="utf-8"?>
 <p:sld xmlns:a="http://schemas.openxmlformats.org/drawingml/2006/main" xmlns:r="http://schemas.openxmlformats.org/officeDocument/2006/relationships" xmlns:mc="http://schemas.openxmlformats.org/markup-compatibility/2006" xmlns:mv="urn:schemas-microsoft-com:mac:vml" xmlns:p="http://schemas.openxmlformats.org/presentationml/2006/main" mc:Ignorable="mv" mc:PreserveAttributes="mv:*">
   <p:cSld>
     <p:spTree>
@@ -10341,7 +12002,7 @@
             <a:fld id="{6E2D2B3B-882E-40F3-A32F-6DD516915044}" type="slidenum">
               <a:rPr lang="en-US" smtClean="0"/>
               <a:pPr/>
-              <a:t>6</a:t>
+              <a:t>7</a:t>
             </a:fld>
             <a:endParaRPr lang="en-US"/>
           </a:p>
@@ -10901,7 +12562,7 @@
 </p:sld>
 </file>
 
-<file path=ppt/slides/slide7.xml><?xml version="1.0" encoding="utf-8"?>
+<file path=ppt/slides/slide8.xml><?xml version="1.0" encoding="utf-8"?>
 <p:sld xmlns:a="http://schemas.openxmlformats.org/drawingml/2006/main" xmlns:r="http://schemas.openxmlformats.org/officeDocument/2006/relationships" xmlns:mc="http://schemas.openxmlformats.org/markup-compatibility/2006" xmlns:mv="urn:schemas-microsoft-com:mac:vml" xmlns:p="http://schemas.openxmlformats.org/presentationml/2006/main" mc:Ignorable="mv" mc:PreserveAttributes="mv:*">
   <p:cSld>
     <p:spTree>
@@ -11006,7 +12667,7 @@
             <a:fld id="{6E2D2B3B-882E-40F3-A32F-6DD516915044}" type="slidenum">
               <a:rPr lang="en-US" smtClean="0"/>
               <a:pPr/>
-              <a:t>7</a:t>
+              <a:t>8</a:t>
             </a:fld>
             <a:endParaRPr lang="en-US"/>
           </a:p>
@@ -11290,7 +12951,7 @@
 </p:sld>
 </file>
 
-<file path=ppt/slides/slide8.xml><?xml version="1.0" encoding="utf-8"?>
+<file path=ppt/slides/slide9.xml><?xml version="1.0" encoding="utf-8"?>
 <p:sld xmlns:a="http://schemas.openxmlformats.org/drawingml/2006/main" xmlns:r="http://schemas.openxmlformats.org/officeDocument/2006/relationships" xmlns:mc="http://schemas.openxmlformats.org/markup-compatibility/2006" xmlns:mv="urn:schemas-microsoft-com:mac:vml" xmlns:p="http://schemas.openxmlformats.org/presentationml/2006/main" mc:Ignorable="mv" mc:PreserveAttributes="mv:*">
   <p:cSld>
     <p:spTree>
@@ -11395,7 +13056,7 @@
             <a:fld id="{6E2D2B3B-882E-40F3-A32F-6DD516915044}" type="slidenum">
               <a:rPr lang="en-US" smtClean="0"/>
               <a:pPr/>
-              <a:t>8</a:t>
+              <a:t>9</a:t>
             </a:fld>
             <a:endParaRPr lang="en-US"/>
           </a:p>
@@ -11784,207 +13445,6 @@
           </a:p>
         </p:txBody>
       </p:sp>
-    </p:spTree>
-  </p:cSld>
-  <p:clrMapOvr>
-    <a:masterClrMapping/>
-  </p:clrMapOvr>
-  <p:timing>
-    <p:tnLst>
-      <p:par>
-        <p:cTn id="1" dur="indefinite" restart="never" nodeType="tmRoot"/>
-      </p:par>
-    </p:tnLst>
-  </p:timing>
-</p:sld>
-</file>
-
-<file path=ppt/slides/slide9.xml><?xml version="1.0" encoding="utf-8"?>
-<p:sld xmlns:a="http://schemas.openxmlformats.org/drawingml/2006/main" xmlns:r="http://schemas.openxmlformats.org/officeDocument/2006/relationships" xmlns:mc="http://schemas.openxmlformats.org/markup-compatibility/2006" xmlns:mv="urn:schemas-microsoft-com:mac:vml" xmlns:p="http://schemas.openxmlformats.org/presentationml/2006/main" mc:Ignorable="mv" mc:PreserveAttributes="mv:*">
-  <p:cSld>
-    <p:spTree>
-      <p:nvGrpSpPr>
-        <p:cNvPr id="1" name=""/>
-        <p:cNvGrpSpPr/>
-        <p:nvPr/>
-      </p:nvGrpSpPr>
-      <p:grpSpPr>
-        <a:xfrm>
-          <a:off x="0" y="0"/>
-          <a:ext cx="0" cy="0"/>
-          <a:chOff x="0" y="0"/>
-          <a:chExt cx="0" cy="0"/>
-        </a:xfrm>
-      </p:grpSpPr>
-      <p:sp>
-        <p:nvSpPr>
-          <p:cNvPr id="2" name="Title 1"/>
-          <p:cNvSpPr>
-            <a:spLocks noGrp="1"/>
-          </p:cNvSpPr>
-          <p:nvPr>
-            <p:ph type="title"/>
-          </p:nvPr>
-        </p:nvSpPr>
-        <p:spPr/>
-        <p:txBody>
-          <a:bodyPr/>
-          <a:lstStyle/>
-          <a:p>
-            <a:r>
-              <a:rPr lang="en-US" dirty="0" smtClean="0"/>
-              <a:t>cert-</a:t>
-            </a:r>
-            <a:r>
-              <a:rPr lang="en-US" dirty="0" err="1" smtClean="0"/>
-              <a:t>mbddr</a:t>
-            </a:r>
-            <a:r>
-              <a:rPr lang="en-US" dirty="0" smtClean="0"/>
-              <a:t> Project</a:t>
-            </a:r>
-            <a:endParaRPr lang="en-US" dirty="0"/>
-          </a:p>
-        </p:txBody>
-      </p:sp>
-      <p:sp>
-        <p:nvSpPr>
-          <p:cNvPr id="4" name="TextBox 3"/>
-          <p:cNvSpPr txBox="1"/>
-          <p:nvPr/>
-        </p:nvSpPr>
-        <p:spPr>
-          <a:xfrm>
-            <a:off x="809834" y="1475155"/>
-            <a:ext cx="7318605" cy="923330"/>
-          </a:xfrm>
-          <a:prstGeom prst="rect">
-            <a:avLst/>
-          </a:prstGeom>
-          <a:noFill/>
-        </p:spPr>
-        <p:txBody>
-          <a:bodyPr wrap="square" rtlCol="0">
-            <a:spAutoFit/>
-          </a:bodyPr>
-          <a:lstStyle/>
-          <a:p>
-            <a:r>
-              <a:rPr lang="en-US" i="1" dirty="0" err="1"/>
-              <a:t>m</a:t>
-            </a:r>
-            <a:r>
-              <a:rPr lang="en-US" i="1" dirty="0" err="1" smtClean="0"/>
-              <a:t>beddr</a:t>
-            </a:r>
-            <a:r>
-              <a:rPr lang="en-US" dirty="0" smtClean="0"/>
-              <a:t> is a set of </a:t>
-            </a:r>
-            <a:r>
-              <a:rPr lang="en-US" dirty="0" err="1" smtClean="0"/>
-              <a:t>DSLs</a:t>
-            </a:r>
-            <a:r>
-              <a:rPr lang="en-US" dirty="0" smtClean="0"/>
-              <a:t> written in MPS, to ease the writing of C code. C code is generated through a model transformation.</a:t>
-            </a:r>
-          </a:p>
-          <a:p>
-            <a:endParaRPr lang="en-US" dirty="0"/>
-          </a:p>
-        </p:txBody>
-      </p:sp>
-      <p:pic>
-        <p:nvPicPr>
-          <p:cNvPr id="15362" name="Picture 2"/>
-          <p:cNvPicPr>
-            <a:picLocks noChangeAspect="1" noChangeArrowheads="1"/>
-          </p:cNvPicPr>
-          <p:nvPr/>
-        </p:nvPicPr>
-        <p:blipFill>
-          <a:blip r:embed="rId2"/>
-          <a:srcRect/>
-          <a:stretch>
-            <a:fillRect/>
-          </a:stretch>
-        </p:blipFill>
-        <p:spPr bwMode="auto">
-          <a:xfrm>
-            <a:off x="4909694" y="6121418"/>
-            <a:ext cx="1771092" cy="547987"/>
-          </a:xfrm>
-          <a:prstGeom prst="rect">
-            <a:avLst/>
-          </a:prstGeom>
-          <a:noFill/>
-          <a:ln w="9525">
-            <a:noFill/>
-            <a:miter lim="800000"/>
-            <a:headEnd/>
-            <a:tailEnd/>
-          </a:ln>
-          <a:effectLst/>
-        </p:spPr>
-      </p:pic>
-      <p:pic>
-        <p:nvPicPr>
-          <p:cNvPr id="20" name="Picture 19" descr="mbeddr_example.png"/>
-          <p:cNvPicPr>
-            <a:picLocks noChangeAspect="1"/>
-          </p:cNvPicPr>
-          <p:nvPr/>
-        </p:nvPicPr>
-        <p:blipFill>
-          <a:blip r:embed="rId3"/>
-          <a:stretch>
-            <a:fillRect/>
-          </a:stretch>
-        </p:blipFill>
-        <p:spPr>
-          <a:xfrm>
-            <a:off x="1416238" y="2325776"/>
-            <a:ext cx="5998349" cy="3394898"/>
-          </a:xfrm>
-          <a:prstGeom prst="rect">
-            <a:avLst/>
-          </a:prstGeom>
-        </p:spPr>
-      </p:pic>
-      <p:pic>
-        <p:nvPicPr>
-          <p:cNvPr id="21" name="Picture 3"/>
-          <p:cNvPicPr>
-            <a:picLocks noChangeAspect="1" noChangeArrowheads="1"/>
-          </p:cNvPicPr>
-          <p:nvPr/>
-        </p:nvPicPr>
-        <p:blipFill>
-          <a:blip r:embed="rId4"/>
-          <a:srcRect/>
-          <a:stretch>
-            <a:fillRect/>
-          </a:stretch>
-        </p:blipFill>
-        <p:spPr bwMode="auto">
-          <a:xfrm>
-            <a:off x="2085773" y="5821180"/>
-            <a:ext cx="1741715" cy="794017"/>
-          </a:xfrm>
-          <a:prstGeom prst="rect">
-            <a:avLst/>
-          </a:prstGeom>
-          <a:noFill/>
-          <a:ln w="9525">
-            <a:noFill/>
-            <a:miter lim="800000"/>
-            <a:headEnd/>
-            <a:tailEnd/>
-          </a:ln>
-          <a:effectLst/>
-        </p:spPr>
-      </p:pic>
     </p:spTree>
   </p:cSld>
   <p:clrMapOvr>

</xml_diff>